<commit_message>
Aenderungen an Praesentation Julia
</commit_message>
<xml_diff>
--- a/70 Praesentation/50 StarGreg Finish.pptx
+++ b/70 Praesentation/50 StarGreg Finish.pptx
@@ -24,9 +24,9 @@
     <p:sldId id="279" r:id="rId12"/>
     <p:sldId id="280" r:id="rId13"/>
     <p:sldId id="281" r:id="rId14"/>
-    <p:sldId id="282" r:id="rId15"/>
-    <p:sldId id="283" r:id="rId16"/>
-    <p:sldId id="284" r:id="rId17"/>
+    <p:sldId id="284" r:id="rId15"/>
+    <p:sldId id="282" r:id="rId16"/>
+    <p:sldId id="283" r:id="rId17"/>
     <p:sldId id="289" r:id="rId18"/>
     <p:sldId id="290" r:id="rId19"/>
     <p:sldId id="291" r:id="rId20"/>
@@ -139,7 +139,7 @@
 <file path=ppt/charts/chart1.xml><?xml version="1.0" encoding="utf-8"?>
 <c:chartSpace xmlns:c="http://schemas.openxmlformats.org/drawingml/2006/chart" xmlns:a="http://schemas.openxmlformats.org/drawingml/2006/main" xmlns:r="http://schemas.openxmlformats.org/officeDocument/2006/relationships">
   <c:date1904 val="0"/>
-  <c:lang val="en-US"/>
+  <c:lang val="de-DE"/>
   <c:roundedCorners val="0"/>
   <mc:AlternateContent xmlns:mc="http://schemas.openxmlformats.org/markup-compatibility/2006">
     <mc:Choice xmlns:c14="http://schemas.microsoft.com/office/drawing/2007/8/2/chart" Requires="c14">
@@ -157,10 +157,10 @@
           <c:layoutTarget val="inner"/>
           <c:xMode val="edge"/>
           <c:yMode val="edge"/>
-          <c:x val="6.0224920824536197E-2"/>
-          <c:y val="9.8342591307763197E-2"/>
-          <c:w val="0.63794015307256402"/>
-          <c:h val="0.57951831004715504"/>
+          <c:x val="0.0602249208245362"/>
+          <c:y val="0.0983425913077632"/>
+          <c:w val="0.637940153072564"/>
+          <c:h val="0.579518310047155"/>
         </c:manualLayout>
       </c:layout>
       <c:lineChart>
@@ -228,34 +228,34 @@
                 <c:formatCode>General</c:formatCode>
                 <c:ptCount val="10"/>
                 <c:pt idx="0">
-                  <c:v>60</c:v>
+                  <c:v>60.0</c:v>
                 </c:pt>
                 <c:pt idx="1">
-                  <c:v>66</c:v>
+                  <c:v>66.0</c:v>
                 </c:pt>
                 <c:pt idx="2">
-                  <c:v>72</c:v>
+                  <c:v>72.0</c:v>
                 </c:pt>
                 <c:pt idx="3">
-                  <c:v>66</c:v>
+                  <c:v>66.0</c:v>
                 </c:pt>
                 <c:pt idx="4">
-                  <c:v>78</c:v>
+                  <c:v>78.0</c:v>
                 </c:pt>
                 <c:pt idx="5">
-                  <c:v>78</c:v>
+                  <c:v>78.0</c:v>
                 </c:pt>
                 <c:pt idx="6">
-                  <c:v>84</c:v>
+                  <c:v>84.0</c:v>
                 </c:pt>
                 <c:pt idx="7">
-                  <c:v>84</c:v>
+                  <c:v>84.0</c:v>
                 </c:pt>
                 <c:pt idx="8">
-                  <c:v>96</c:v>
+                  <c:v>96.0</c:v>
                 </c:pt>
                 <c:pt idx="9">
-                  <c:v>90</c:v>
+                  <c:v>90.0</c:v>
                 </c:pt>
               </c:numCache>
             </c:numRef>
@@ -324,34 +324,34 @@
                 <c:formatCode>General</c:formatCode>
                 <c:ptCount val="10"/>
                 <c:pt idx="0">
-                  <c:v>30</c:v>
+                  <c:v>30.0</c:v>
                 </c:pt>
                 <c:pt idx="1">
-                  <c:v>30</c:v>
+                  <c:v>30.0</c:v>
                 </c:pt>
                 <c:pt idx="2">
-                  <c:v>27</c:v>
+                  <c:v>27.0</c:v>
                 </c:pt>
                 <c:pt idx="3">
-                  <c:v>27</c:v>
+                  <c:v>27.0</c:v>
                 </c:pt>
                 <c:pt idx="4">
-                  <c:v>36</c:v>
+                  <c:v>36.0</c:v>
                 </c:pt>
                 <c:pt idx="5">
-                  <c:v>36</c:v>
+                  <c:v>36.0</c:v>
                 </c:pt>
                 <c:pt idx="6">
-                  <c:v>48</c:v>
+                  <c:v>48.0</c:v>
                 </c:pt>
                 <c:pt idx="7">
-                  <c:v>48</c:v>
+                  <c:v>48.0</c:v>
                 </c:pt>
                 <c:pt idx="8">
-                  <c:v>39</c:v>
+                  <c:v>39.0</c:v>
                 </c:pt>
                 <c:pt idx="9">
-                  <c:v>39</c:v>
+                  <c:v>39.0</c:v>
                 </c:pt>
               </c:numCache>
             </c:numRef>
@@ -420,34 +420,34 @@
                 <c:formatCode>General</c:formatCode>
                 <c:ptCount val="10"/>
                 <c:pt idx="0">
-                  <c:v>20</c:v>
+                  <c:v>20.0</c:v>
                 </c:pt>
                 <c:pt idx="1">
-                  <c:v>24</c:v>
+                  <c:v>24.0</c:v>
                 </c:pt>
                 <c:pt idx="2">
-                  <c:v>24</c:v>
+                  <c:v>24.0</c:v>
                 </c:pt>
                 <c:pt idx="3">
-                  <c:v>24</c:v>
+                  <c:v>24.0</c:v>
                 </c:pt>
                 <c:pt idx="4">
-                  <c:v>28</c:v>
+                  <c:v>28.0</c:v>
                 </c:pt>
                 <c:pt idx="5">
-                  <c:v>28</c:v>
+                  <c:v>28.0</c:v>
                 </c:pt>
                 <c:pt idx="6">
-                  <c:v>28</c:v>
+                  <c:v>28.0</c:v>
                 </c:pt>
                 <c:pt idx="7">
-                  <c:v>28</c:v>
+                  <c:v>28.0</c:v>
                 </c:pt>
                 <c:pt idx="8">
-                  <c:v>22</c:v>
+                  <c:v>22.0</c:v>
                 </c:pt>
                 <c:pt idx="9">
-                  <c:v>24</c:v>
+                  <c:v>24.0</c:v>
                 </c:pt>
               </c:numCache>
             </c:numRef>
@@ -692,11 +692,11 @@
         </c:dLbls>
         <c:marker val="1"/>
         <c:smooth val="0"/>
-        <c:axId val="176892544"/>
-        <c:axId val="176894336"/>
+        <c:axId val="1825657944"/>
+        <c:axId val="1825654872"/>
       </c:lineChart>
       <c:catAx>
-        <c:axId val="176892544"/>
+        <c:axId val="1825657944"/>
         <c:scaling>
           <c:orientation val="minMax"/>
         </c:scaling>
@@ -705,7 +705,7 @@
         <c:majorTickMark val="out"/>
         <c:minorTickMark val="none"/>
         <c:tickLblPos val="nextTo"/>
-        <c:crossAx val="176894336"/>
+        <c:crossAx val="1825654872"/>
         <c:crosses val="autoZero"/>
         <c:auto val="1"/>
         <c:lblAlgn val="ctr"/>
@@ -713,7 +713,7 @@
         <c:noMultiLvlLbl val="0"/>
       </c:catAx>
       <c:valAx>
-        <c:axId val="176894336"/>
+        <c:axId val="1825654872"/>
         <c:scaling>
           <c:orientation val="minMax"/>
         </c:scaling>
@@ -724,7 +724,7 @@
         <c:majorTickMark val="out"/>
         <c:minorTickMark val="none"/>
         <c:tickLblPos val="nextTo"/>
-        <c:crossAx val="176892544"/>
+        <c:crossAx val="1825657944"/>
         <c:crosses val="autoZero"/>
         <c:crossBetween val="between"/>
       </c:valAx>
@@ -5616,7 +5616,7 @@
                 <a:srgbClr val="000000"/>
               </a:solidFill>
             </a:rPr>
-            <a:t>Produktion der Raumschiffe</a:t>
+            <a:t>Raumschiffe produzieren</a:t>
           </a:r>
           <a:endParaRPr lang="de-DE" sz="1100" b="1" dirty="0">
             <a:solidFill>
@@ -6083,7 +6083,7 @@
       <dsp:spPr>
         <a:xfrm>
           <a:off x="0" y="9081"/>
-          <a:ext cx="7610475" cy="1127294"/>
+          <a:ext cx="7610476" cy="1127295"/>
         </a:xfrm>
         <a:prstGeom prst="roundRect">
           <a:avLst/>
@@ -6158,7 +6158,7 @@
       </dsp:txBody>
       <dsp:txXfrm>
         <a:off x="55030" y="64111"/>
-        <a:ext cx="7500415" cy="1017234"/>
+        <a:ext cx="7500416" cy="1017235"/>
       </dsp:txXfrm>
     </dsp:sp>
     <dsp:sp modelId="{66D20C69-28B9-4F44-BA03-A32A664F4ABF}">
@@ -6169,7 +6169,7 @@
       <dsp:spPr>
         <a:xfrm>
           <a:off x="0" y="1271736"/>
-          <a:ext cx="7610475" cy="1127294"/>
+          <a:ext cx="7610476" cy="1127295"/>
         </a:xfrm>
         <a:prstGeom prst="roundRect">
           <a:avLst/>
@@ -6244,7 +6244,7 @@
       </dsp:txBody>
       <dsp:txXfrm>
         <a:off x="55030" y="1326766"/>
-        <a:ext cx="7500415" cy="1017234"/>
+        <a:ext cx="7500416" cy="1017235"/>
       </dsp:txXfrm>
     </dsp:sp>
     <dsp:sp modelId="{500B5B37-7E8D-1645-A380-08755AE3FE7A}">
@@ -6254,8 +6254,8 @@
       </dsp:nvSpPr>
       <dsp:spPr>
         <a:xfrm>
-          <a:off x="0" y="2534390"/>
-          <a:ext cx="7610475" cy="1127294"/>
+          <a:off x="0" y="2534391"/>
+          <a:ext cx="7610476" cy="1127295"/>
         </a:xfrm>
         <a:prstGeom prst="roundRect">
           <a:avLst/>
@@ -6329,8 +6329,8 @@
         </a:p>
       </dsp:txBody>
       <dsp:txXfrm>
-        <a:off x="55030" y="2589420"/>
-        <a:ext cx="7500415" cy="1017234"/>
+        <a:off x="55030" y="2589421"/>
+        <a:ext cx="7500416" cy="1017235"/>
       </dsp:txXfrm>
     </dsp:sp>
   </dsp:spTree>
@@ -6918,7 +6918,7 @@
       <dsp:spPr>
         <a:xfrm>
           <a:off x="3257" y="0"/>
-          <a:ext cx="1959163" cy="720189"/>
+          <a:ext cx="1959163" cy="720190"/>
         </a:xfrm>
         <a:prstGeom prst="roundRect">
           <a:avLst>
@@ -6993,7 +6993,7 @@
       <dsp:spPr>
         <a:xfrm>
           <a:off x="395089" y="0"/>
-          <a:ext cx="1459576" cy="720189"/>
+          <a:ext cx="1459576" cy="720190"/>
         </a:xfrm>
         <a:prstGeom prst="rect">
           <a:avLst/>
@@ -7046,7 +7046,7 @@
       </dsp:txBody>
       <dsp:txXfrm>
         <a:off x="395089" y="0"/>
-        <a:ext cx="1459576" cy="720189"/>
+        <a:ext cx="1459576" cy="720190"/>
       </dsp:txXfrm>
     </dsp:sp>
     <dsp:sp modelId="{27C4E44A-4A29-46F0-A0A8-71D6BA3C05A4}">
@@ -7057,7 +7057,7 @@
       <dsp:spPr>
         <a:xfrm>
           <a:off x="2030990" y="0"/>
-          <a:ext cx="1959163" cy="720189"/>
+          <a:ext cx="1959163" cy="720190"/>
         </a:xfrm>
         <a:prstGeom prst="roundRect">
           <a:avLst>
@@ -7179,7 +7179,7 @@
       <dsp:spPr>
         <a:xfrm>
           <a:off x="2422823" y="0"/>
-          <a:ext cx="1459576" cy="720189"/>
+          <a:ext cx="1459576" cy="720190"/>
         </a:xfrm>
         <a:prstGeom prst="rect">
           <a:avLst/>
@@ -7236,7 +7236,7 @@
       </dsp:txBody>
       <dsp:txXfrm>
         <a:off x="2422823" y="0"/>
-        <a:ext cx="1459576" cy="720189"/>
+        <a:ext cx="1459576" cy="720190"/>
       </dsp:txXfrm>
     </dsp:sp>
     <dsp:sp modelId="{077E1FEA-BF70-4712-8614-E1B177C25C67}">
@@ -7247,7 +7247,7 @@
       <dsp:spPr>
         <a:xfrm>
           <a:off x="4058724" y="0"/>
-          <a:ext cx="1959163" cy="720189"/>
+          <a:ext cx="1959163" cy="720190"/>
         </a:xfrm>
         <a:prstGeom prst="roundRect">
           <a:avLst>
@@ -7369,7 +7369,7 @@
       <dsp:spPr>
         <a:xfrm>
           <a:off x="4450557" y="0"/>
-          <a:ext cx="1459576" cy="720189"/>
+          <a:ext cx="1459576" cy="720190"/>
         </a:xfrm>
         <a:prstGeom prst="rect">
           <a:avLst/>
@@ -7422,7 +7422,7 @@
       </dsp:txBody>
       <dsp:txXfrm>
         <a:off x="4450557" y="0"/>
-        <a:ext cx="1459576" cy="720189"/>
+        <a:ext cx="1459576" cy="720190"/>
       </dsp:txXfrm>
     </dsp:sp>
     <dsp:sp modelId="{8A5591B4-1888-4A2F-8CFF-FF31D4148698}">
@@ -7433,7 +7433,7 @@
       <dsp:spPr>
         <a:xfrm>
           <a:off x="6086458" y="0"/>
-          <a:ext cx="1959163" cy="720189"/>
+          <a:ext cx="1959163" cy="720190"/>
         </a:xfrm>
         <a:prstGeom prst="roundRect">
           <a:avLst>
@@ -7555,7 +7555,7 @@
       <dsp:spPr>
         <a:xfrm>
           <a:off x="6478291" y="0"/>
-          <a:ext cx="1459576" cy="720189"/>
+          <a:ext cx="1459576" cy="720190"/>
         </a:xfrm>
         <a:prstGeom prst="rect">
           <a:avLst/>
@@ -7608,7 +7608,7 @@
       </dsp:txBody>
       <dsp:txXfrm>
         <a:off x="6478291" y="0"/>
-        <a:ext cx="1459576" cy="720189"/>
+        <a:ext cx="1459576" cy="720190"/>
       </dsp:txXfrm>
     </dsp:sp>
   </dsp:spTree>
@@ -8341,7 +8341,7 @@
                 <a:srgbClr val="000000"/>
               </a:solidFill>
             </a:rPr>
-            <a:t>Produktion der Raumschiffe</a:t>
+            <a:t>Raumschiffe produzieren</a:t>
           </a:r>
           <a:endParaRPr lang="de-DE" sz="1100" b="1" kern="1200" dirty="0">
             <a:solidFill>
@@ -13871,7 +13871,7 @@
           <a:p>
             <a:fld id="{27667466-E0D7-FD4B-BBEF-602BF6B185FF}" type="datetimeFigureOut">
               <a:rPr lang="de-DE" smtClean="0"/>
-              <a:t>06.11.2011</a:t>
+              <a:t>07.11.11</a:t>
             </a:fld>
             <a:endParaRPr lang="de-DE"/>
           </a:p>
@@ -14037,7 +14037,7 @@
           <a:p>
             <a:fld id="{358CF69D-E791-E447-927B-A50D3ED4596D}" type="datetimeFigureOut">
               <a:rPr lang="de-DE" smtClean="0"/>
-              <a:t>06.11.2011</a:t>
+              <a:t>07.11.11</a:t>
             </a:fld>
             <a:endParaRPr lang="de-DE"/>
           </a:p>
@@ -15060,7 +15060,6 @@
               <a:rPr lang="de-DE" baseline="0" dirty="0" smtClean="0"/>
               <a:t>Märkte verwalten Typen</a:t>
             </a:r>
-            <a:endParaRPr lang="de-DE" baseline="0" dirty="0" smtClean="0"/>
           </a:p>
           <a:p>
             <a:pPr marL="171450" indent="-171450">
@@ -20519,7 +20518,7 @@
   <p:timing>
     <p:tnLst>
       <p:par>
-        <p:cTn id="1" dur="indefinite" restart="never" nodeType="tmRoot"/>
+        <p:cTn xmlns:p14="http://schemas.microsoft.com/office/powerpoint/2010/main" id="1" dur="indefinite" restart="never" nodeType="tmRoot"/>
       </p:par>
     </p:tnLst>
   </p:timing>
@@ -20682,7 +20681,7 @@
   <p:timing>
     <p:tnLst>
       <p:par>
-        <p:cTn id="1" dur="indefinite" restart="never" nodeType="tmRoot"/>
+        <p:cTn xmlns:p14="http://schemas.microsoft.com/office/powerpoint/2010/main" id="1" dur="indefinite" restart="never" nodeType="tmRoot"/>
       </p:par>
     </p:tnLst>
   </p:timing>
@@ -20960,7 +20959,7 @@
   <p:timing>
     <p:tnLst>
       <p:par>
-        <p:cTn id="1" dur="indefinite" restart="never" nodeType="tmRoot"/>
+        <p:cTn xmlns:p14="http://schemas.microsoft.com/office/powerpoint/2010/main" id="1" dur="indefinite" restart="never" nodeType="tmRoot"/>
       </p:par>
     </p:tnLst>
   </p:timing>
@@ -21289,7 +21288,7 @@
   <p:timing>
     <p:tnLst>
       <p:par>
-        <p:cTn id="1" dur="indefinite" restart="never" nodeType="tmRoot"/>
+        <p:cTn xmlns:p14="http://schemas.microsoft.com/office/powerpoint/2010/main" id="1" dur="indefinite" restart="never" nodeType="tmRoot"/>
       </p:par>
     </p:tnLst>
   </p:timing>
@@ -21426,7 +21425,7 @@
   <p:timing>
     <p:tnLst>
       <p:par>
-        <p:cTn id="1" dur="indefinite" restart="never" nodeType="tmRoot"/>
+        <p:cTn xmlns:p14="http://schemas.microsoft.com/office/powerpoint/2010/main" id="1" dur="indefinite" restart="never" nodeType="tmRoot"/>
       </p:par>
     </p:tnLst>
   </p:timing>
@@ -21514,6 +21513,140 @@
             <a:fld id="{4A822907-8A9D-4F6B-98F6-913902AD56B5}" type="slidenum">
               <a:rPr lang="en-US" smtClean="0"/>
               <a:t>14</a:t>
+            </a:fld>
+            <a:endParaRPr lang="en-US"/>
+          </a:p>
+        </p:txBody>
+      </p:sp>
+      <p:pic>
+        <p:nvPicPr>
+          <p:cNvPr id="7" name="Inhaltsplatzhalter 6" descr="Finanzen.jpg"/>
+          <p:cNvPicPr>
+            <a:picLocks noGrp="1" noChangeAspect="1"/>
+          </p:cNvPicPr>
+          <p:nvPr>
+            <p:ph idx="4294967295"/>
+          </p:nvPr>
+        </p:nvPicPr>
+        <p:blipFill rotWithShape="1">
+          <a:blip r:embed="rId2">
+            <a:extLst>
+              <a:ext uri="{28A0092B-C50C-407E-A947-70E740481C1C}">
+                <a14:useLocalDpi xmlns:a14="http://schemas.microsoft.com/office/drawing/2010/main" val="0"/>
+              </a:ext>
+            </a:extLst>
+          </a:blip>
+          <a:srcRect l="2677" r="2496"/>
+          <a:stretch/>
+        </p:blipFill>
+        <p:spPr>
+          <a:xfrm>
+            <a:off x="729814" y="553384"/>
+            <a:ext cx="8060080" cy="6013953"/>
+          </a:xfrm>
+        </p:spPr>
+      </p:pic>
+    </p:spTree>
+    <p:extLst>
+      <p:ext uri="{BB962C8B-B14F-4D97-AF65-F5344CB8AC3E}">
+        <p14:creationId xmlns:p14="http://schemas.microsoft.com/office/powerpoint/2010/main" val="2256243919"/>
+      </p:ext>
+    </p:extLst>
+  </p:cSld>
+  <p:clrMapOvr>
+    <a:masterClrMapping/>
+  </p:clrMapOvr>
+  <p:timing>
+    <p:tnLst>
+      <p:par>
+        <p:cTn xmlns:p14="http://schemas.microsoft.com/office/powerpoint/2010/main" id="1" dur="indefinite" restart="never" nodeType="tmRoot"/>
+      </p:par>
+    </p:tnLst>
+  </p:timing>
+</p:sld>
+</file>
+
+<file path=ppt/slides/slide15.xml><?xml version="1.0" encoding="utf-8"?>
+<p:sld xmlns:a="http://schemas.openxmlformats.org/drawingml/2006/main" xmlns:r="http://schemas.openxmlformats.org/officeDocument/2006/relationships" xmlns:p="http://schemas.openxmlformats.org/presentationml/2006/main">
+  <p:cSld>
+    <p:spTree>
+      <p:nvGrpSpPr>
+        <p:cNvPr id="1" name=""/>
+        <p:cNvGrpSpPr/>
+        <p:nvPr/>
+      </p:nvGrpSpPr>
+      <p:grpSpPr>
+        <a:xfrm>
+          <a:off x="0" y="0"/>
+          <a:ext cx="0" cy="0"/>
+          <a:chOff x="0" y="0"/>
+          <a:chExt cx="0" cy="0"/>
+        </a:xfrm>
+      </p:grpSpPr>
+      <p:sp>
+        <p:nvSpPr>
+          <p:cNvPr id="4" name="Datumsplatzhalter 3"/>
+          <p:cNvSpPr>
+            <a:spLocks noGrp="1"/>
+          </p:cNvSpPr>
+          <p:nvPr>
+            <p:ph type="dt" sz="half" idx="10"/>
+          </p:nvPr>
+        </p:nvSpPr>
+        <p:spPr/>
+        <p:txBody>
+          <a:bodyPr/>
+          <a:lstStyle/>
+          <a:p>
+            <a:r>
+              <a:rPr lang="de-DE" smtClean="0"/>
+              <a:t>04.11.11</a:t>
+            </a:r>
+            <a:endParaRPr lang="en-US"/>
+          </a:p>
+        </p:txBody>
+      </p:sp>
+      <p:sp>
+        <p:nvSpPr>
+          <p:cNvPr id="5" name="Fußzeilenplatzhalter 4"/>
+          <p:cNvSpPr>
+            <a:spLocks noGrp="1"/>
+          </p:cNvSpPr>
+          <p:nvPr>
+            <p:ph type="ftr" sz="quarter" idx="11"/>
+          </p:nvPr>
+        </p:nvSpPr>
+        <p:spPr/>
+        <p:txBody>
+          <a:bodyPr/>
+          <a:lstStyle/>
+          <a:p>
+            <a:r>
+              <a:rPr lang="de-DE" smtClean="0"/>
+              <a:t>Star Greg</a:t>
+            </a:r>
+            <a:endParaRPr lang="en-US"/>
+          </a:p>
+        </p:txBody>
+      </p:sp>
+      <p:sp>
+        <p:nvSpPr>
+          <p:cNvPr id="6" name="Foliennummernplatzhalter 5"/>
+          <p:cNvSpPr>
+            <a:spLocks noGrp="1"/>
+          </p:cNvSpPr>
+          <p:nvPr>
+            <p:ph type="sldNum" sz="quarter" idx="12"/>
+          </p:nvPr>
+        </p:nvSpPr>
+        <p:spPr/>
+        <p:txBody>
+          <a:bodyPr/>
+          <a:lstStyle/>
+          <a:p>
+            <a:fld id="{4A822907-8A9D-4F6B-98F6-913902AD56B5}" type="slidenum">
+              <a:rPr lang="en-US" smtClean="0"/>
+              <a:t>15</a:t>
             </a:fld>
             <a:endParaRPr lang="en-US"/>
           </a:p>
@@ -21560,14 +21693,14 @@
   <p:timing>
     <p:tnLst>
       <p:par>
-        <p:cTn id="1" dur="indefinite" restart="never" nodeType="tmRoot"/>
+        <p:cTn xmlns:p14="http://schemas.microsoft.com/office/powerpoint/2010/main" id="1" dur="indefinite" restart="never" nodeType="tmRoot"/>
       </p:par>
     </p:tnLst>
   </p:timing>
 </p:sld>
 </file>
 
-<file path=ppt/slides/slide15.xml><?xml version="1.0" encoding="utf-8"?>
+<file path=ppt/slides/slide16.xml><?xml version="1.0" encoding="utf-8"?>
 <p:sld xmlns:a="http://schemas.openxmlformats.org/drawingml/2006/main" xmlns:r="http://schemas.openxmlformats.org/officeDocument/2006/relationships" xmlns:p="http://schemas.openxmlformats.org/presentationml/2006/main">
   <p:cSld>
     <p:spTree>
@@ -21647,7 +21780,7 @@
           <a:p>
             <a:fld id="{4A822907-8A9D-4F6B-98F6-913902AD56B5}" type="slidenum">
               <a:rPr lang="en-US" smtClean="0"/>
-              <a:t>15</a:t>
+              <a:t>16</a:t>
             </a:fld>
             <a:endParaRPr lang="en-US"/>
           </a:p>
@@ -21694,141 +21827,7 @@
   <p:timing>
     <p:tnLst>
       <p:par>
-        <p:cTn id="1" dur="indefinite" restart="never" nodeType="tmRoot"/>
-      </p:par>
-    </p:tnLst>
-  </p:timing>
-</p:sld>
-</file>
-
-<file path=ppt/slides/slide16.xml><?xml version="1.0" encoding="utf-8"?>
-<p:sld xmlns:a="http://schemas.openxmlformats.org/drawingml/2006/main" xmlns:r="http://schemas.openxmlformats.org/officeDocument/2006/relationships" xmlns:p="http://schemas.openxmlformats.org/presentationml/2006/main">
-  <p:cSld>
-    <p:spTree>
-      <p:nvGrpSpPr>
-        <p:cNvPr id="1" name=""/>
-        <p:cNvGrpSpPr/>
-        <p:nvPr/>
-      </p:nvGrpSpPr>
-      <p:grpSpPr>
-        <a:xfrm>
-          <a:off x="0" y="0"/>
-          <a:ext cx="0" cy="0"/>
-          <a:chOff x="0" y="0"/>
-          <a:chExt cx="0" cy="0"/>
-        </a:xfrm>
-      </p:grpSpPr>
-      <p:sp>
-        <p:nvSpPr>
-          <p:cNvPr id="4" name="Datumsplatzhalter 3"/>
-          <p:cNvSpPr>
-            <a:spLocks noGrp="1"/>
-          </p:cNvSpPr>
-          <p:nvPr>
-            <p:ph type="dt" sz="half" idx="10"/>
-          </p:nvPr>
-        </p:nvSpPr>
-        <p:spPr/>
-        <p:txBody>
-          <a:bodyPr/>
-          <a:lstStyle/>
-          <a:p>
-            <a:r>
-              <a:rPr lang="de-DE" smtClean="0"/>
-              <a:t>04.11.11</a:t>
-            </a:r>
-            <a:endParaRPr lang="en-US"/>
-          </a:p>
-        </p:txBody>
-      </p:sp>
-      <p:sp>
-        <p:nvSpPr>
-          <p:cNvPr id="5" name="Fußzeilenplatzhalter 4"/>
-          <p:cNvSpPr>
-            <a:spLocks noGrp="1"/>
-          </p:cNvSpPr>
-          <p:nvPr>
-            <p:ph type="ftr" sz="quarter" idx="11"/>
-          </p:nvPr>
-        </p:nvSpPr>
-        <p:spPr/>
-        <p:txBody>
-          <a:bodyPr/>
-          <a:lstStyle/>
-          <a:p>
-            <a:r>
-              <a:rPr lang="de-DE" smtClean="0"/>
-              <a:t>Star Greg</a:t>
-            </a:r>
-            <a:endParaRPr lang="en-US"/>
-          </a:p>
-        </p:txBody>
-      </p:sp>
-      <p:sp>
-        <p:nvSpPr>
-          <p:cNvPr id="6" name="Foliennummernplatzhalter 5"/>
-          <p:cNvSpPr>
-            <a:spLocks noGrp="1"/>
-          </p:cNvSpPr>
-          <p:nvPr>
-            <p:ph type="sldNum" sz="quarter" idx="12"/>
-          </p:nvPr>
-        </p:nvSpPr>
-        <p:spPr/>
-        <p:txBody>
-          <a:bodyPr/>
-          <a:lstStyle/>
-          <a:p>
-            <a:fld id="{4A822907-8A9D-4F6B-98F6-913902AD56B5}" type="slidenum">
-              <a:rPr lang="en-US" smtClean="0"/>
-              <a:t>16</a:t>
-            </a:fld>
-            <a:endParaRPr lang="en-US"/>
-          </a:p>
-        </p:txBody>
-      </p:sp>
-      <p:pic>
-        <p:nvPicPr>
-          <p:cNvPr id="7" name="Inhaltsplatzhalter 6" descr="Finanzen.jpg"/>
-          <p:cNvPicPr>
-            <a:picLocks noGrp="1" noChangeAspect="1"/>
-          </p:cNvPicPr>
-          <p:nvPr>
-            <p:ph idx="4294967295"/>
-          </p:nvPr>
-        </p:nvPicPr>
-        <p:blipFill rotWithShape="1">
-          <a:blip r:embed="rId2">
-            <a:extLst>
-              <a:ext uri="{28A0092B-C50C-407E-A947-70E740481C1C}">
-                <a14:useLocalDpi xmlns:a14="http://schemas.microsoft.com/office/drawing/2010/main" val="0"/>
-              </a:ext>
-            </a:extLst>
-          </a:blip>
-          <a:srcRect l="2677" r="2496"/>
-          <a:stretch/>
-        </p:blipFill>
-        <p:spPr>
-          <a:xfrm>
-            <a:off x="729814" y="553384"/>
-            <a:ext cx="8060080" cy="6013953"/>
-          </a:xfrm>
-        </p:spPr>
-      </p:pic>
-    </p:spTree>
-    <p:extLst>
-      <p:ext uri="{BB962C8B-B14F-4D97-AF65-F5344CB8AC3E}">
-        <p14:creationId xmlns:p14="http://schemas.microsoft.com/office/powerpoint/2010/main" val="2256243919"/>
-      </p:ext>
-    </p:extLst>
-  </p:cSld>
-  <p:clrMapOvr>
-    <a:masterClrMapping/>
-  </p:clrMapOvr>
-  <p:timing>
-    <p:tnLst>
-      <p:par>
-        <p:cTn id="1" dur="indefinite" restart="never" nodeType="tmRoot"/>
+        <p:cTn xmlns:p14="http://schemas.microsoft.com/office/powerpoint/2010/main" id="1" dur="indefinite" restart="never" nodeType="tmRoot"/>
       </p:par>
     </p:tnLst>
   </p:timing>
@@ -21965,7 +21964,7 @@
   <p:timing>
     <p:tnLst>
       <p:par>
-        <p:cTn id="1" dur="indefinite" restart="never" nodeType="tmRoot"/>
+        <p:cTn xmlns:p14="http://schemas.microsoft.com/office/powerpoint/2010/main" id="1" dur="indefinite" restart="never" nodeType="tmRoot"/>
       </p:par>
     </p:tnLst>
   </p:timing>
@@ -23947,7 +23946,7 @@
   <p:timing>
     <p:tnLst>
       <p:par>
-        <p:cTn id="1" dur="indefinite" restart="never" nodeType="tmRoot">
+        <p:cTn xmlns:p14="http://schemas.microsoft.com/office/powerpoint/2010/main" id="1" dur="indefinite" restart="never" nodeType="tmRoot">
           <p:childTnLst>
             <p:seq concurrent="1" nextAc="seek">
               <p:cTn id="2" dur="indefinite" nodeType="mainSeq">
@@ -25029,7 +25028,7 @@
   <p:timing>
     <p:tnLst>
       <p:par>
-        <p:cTn id="1" dur="indefinite" restart="never" nodeType="tmRoot"/>
+        <p:cTn xmlns:p14="http://schemas.microsoft.com/office/powerpoint/2010/main" id="1" dur="indefinite" restart="never" nodeType="tmRoot"/>
       </p:par>
     </p:tnLst>
   </p:timing>
@@ -25191,7 +25190,7 @@
   <p:timing>
     <p:tnLst>
       <p:par>
-        <p:cTn id="1" dur="indefinite" restart="never" nodeType="tmRoot"/>
+        <p:cTn xmlns:p14="http://schemas.microsoft.com/office/powerpoint/2010/main" id="1" dur="indefinite" restart="never" nodeType="tmRoot"/>
       </p:par>
     </p:tnLst>
   </p:timing>
@@ -25602,18 +25601,18 @@
   <p:clrMapOvr>
     <a:masterClrMapping/>
   </p:clrMapOvr>
-  <mc:AlternateContent xmlns:mc="http://schemas.openxmlformats.org/markup-compatibility/2006">
-    <mc:Choice xmlns:p14="http://schemas.microsoft.com/office/powerpoint/2010/main" Requires="p14">
+  <mc:AlternateContent xmlns:mc="http://schemas.openxmlformats.org/markup-compatibility/2006" xmlns:p14="http://schemas.microsoft.com/office/powerpoint/2010/main">
+    <mc:Choice Requires="p14">
       <p:transition p14:dur="0"/>
     </mc:Choice>
-    <mc:Fallback>
+    <mc:Fallback xmlns="">
       <p:transition/>
     </mc:Fallback>
   </mc:AlternateContent>
   <p:timing>
     <p:tnLst>
       <p:par>
-        <p:cTn id="1" dur="indefinite" restart="never" nodeType="tmRoot"/>
+        <p:cTn xmlns:p14="http://schemas.microsoft.com/office/powerpoint/2010/main" id="1" dur="indefinite" restart="never" nodeType="tmRoot"/>
       </p:par>
     </p:tnLst>
   </p:timing>
@@ -26231,13 +26230,13 @@
   <p:clrMapOvr>
     <a:masterClrMapping/>
   </p:clrMapOvr>
-  <mc:AlternateContent xmlns:mc="http://schemas.openxmlformats.org/markup-compatibility/2006">
-    <mc:Choice xmlns:p14="http://schemas.microsoft.com/office/powerpoint/2010/main" Requires="p14">
+  <mc:AlternateContent xmlns:mc="http://schemas.openxmlformats.org/markup-compatibility/2006" xmlns:p14="http://schemas.microsoft.com/office/powerpoint/2010/main">
+    <mc:Choice Requires="p14">
       <p:transition spd="med" p14:dur="700">
         <p:fade/>
       </p:transition>
     </mc:Choice>
-    <mc:Fallback>
+    <mc:Fallback xmlns="">
       <p:transition spd="med">
         <p:fade/>
       </p:transition>
@@ -26246,7 +26245,7 @@
   <p:timing>
     <p:tnLst>
       <p:par>
-        <p:cTn id="1" dur="indefinite" restart="never" nodeType="tmRoot"/>
+        <p:cTn xmlns:p14="http://schemas.microsoft.com/office/powerpoint/2010/main" id="1" dur="indefinite" restart="never" nodeType="tmRoot"/>
       </p:par>
     </p:tnLst>
   </p:timing>
@@ -26922,13 +26921,13 @@
   <p:clrMapOvr>
     <a:masterClrMapping/>
   </p:clrMapOvr>
-  <mc:AlternateContent xmlns:mc="http://schemas.openxmlformats.org/markup-compatibility/2006">
-    <mc:Choice xmlns:p14="http://schemas.microsoft.com/office/powerpoint/2010/main" Requires="p14">
+  <mc:AlternateContent xmlns:mc="http://schemas.openxmlformats.org/markup-compatibility/2006" xmlns:p14="http://schemas.microsoft.com/office/powerpoint/2010/main">
+    <mc:Choice Requires="p14">
       <p:transition spd="med" p14:dur="700">
         <p:fade/>
       </p:transition>
     </mc:Choice>
-    <mc:Fallback>
+    <mc:Fallback xmlns="">
       <p:transition spd="med">
         <p:fade/>
       </p:transition>
@@ -26937,7 +26936,7 @@
   <p:timing>
     <p:tnLst>
       <p:par>
-        <p:cTn id="1" dur="indefinite" restart="never" nodeType="tmRoot"/>
+        <p:cTn xmlns:p14="http://schemas.microsoft.com/office/powerpoint/2010/main" id="1" dur="indefinite" restart="never" nodeType="tmRoot"/>
       </p:par>
     </p:tnLst>
   </p:timing>
@@ -27646,13 +27645,13 @@
   <p:clrMapOvr>
     <a:masterClrMapping/>
   </p:clrMapOvr>
-  <mc:AlternateContent xmlns:mc="http://schemas.openxmlformats.org/markup-compatibility/2006">
-    <mc:Choice xmlns:p14="http://schemas.microsoft.com/office/powerpoint/2010/main" Requires="p14">
+  <mc:AlternateContent xmlns:mc="http://schemas.openxmlformats.org/markup-compatibility/2006" xmlns:p14="http://schemas.microsoft.com/office/powerpoint/2010/main">
+    <mc:Choice Requires="p14">
       <p:transition spd="med" p14:dur="700">
         <p:fade/>
       </p:transition>
     </mc:Choice>
-    <mc:Fallback>
+    <mc:Fallback xmlns="">
       <p:transition spd="med">
         <p:fade/>
       </p:transition>
@@ -27661,7 +27660,7 @@
   <p:timing>
     <p:tnLst>
       <p:par>
-        <p:cTn id="1" dur="indefinite" restart="never" nodeType="tmRoot"/>
+        <p:cTn xmlns:p14="http://schemas.microsoft.com/office/powerpoint/2010/main" id="1" dur="indefinite" restart="never" nodeType="tmRoot"/>
       </p:par>
     </p:tnLst>
   </p:timing>
@@ -27798,7 +27797,7 @@
   <p:timing>
     <p:tnLst>
       <p:par>
-        <p:cTn id="1" dur="indefinite" restart="never" nodeType="tmRoot"/>
+        <p:cTn xmlns:p14="http://schemas.microsoft.com/office/powerpoint/2010/main" id="1" dur="indefinite" restart="never" nodeType="tmRoot"/>
       </p:par>
     </p:tnLst>
   </p:timing>
@@ -27935,7 +27934,7 @@
   <p:timing>
     <p:tnLst>
       <p:par>
-        <p:cTn id="1" dur="indefinite" restart="never" nodeType="tmRoot"/>
+        <p:cTn xmlns:p14="http://schemas.microsoft.com/office/powerpoint/2010/main" id="1" dur="indefinite" restart="never" nodeType="tmRoot"/>
       </p:par>
     </p:tnLst>
   </p:timing>
@@ -28409,11 +28408,11 @@
   <p:clrMapOvr>
     <a:masterClrMapping/>
   </p:clrMapOvr>
-  <p:transition/>
+  <p:transition xmlns:p14="http://schemas.microsoft.com/office/powerpoint/2010/main"/>
   <p:timing>
     <p:tnLst>
       <p:par>
-        <p:cTn id="1" dur="indefinite" restart="never" nodeType="tmRoot">
+        <p:cTn xmlns:p14="http://schemas.microsoft.com/office/powerpoint/2010/main" id="1" dur="indefinite" restart="never" nodeType="tmRoot">
           <p:childTnLst>
             <p:seq concurrent="1" nextAc="seek">
               <p:cTn id="2" dur="indefinite" nodeType="mainSeq">
@@ -28784,7 +28783,7 @@
   <p:timing>
     <p:tnLst>
       <p:par>
-        <p:cTn id="1" dur="indefinite" restart="never" nodeType="tmRoot"/>
+        <p:cTn xmlns:p14="http://schemas.microsoft.com/office/powerpoint/2010/main" id="1" dur="indefinite" restart="never" nodeType="tmRoot"/>
       </p:par>
     </p:tnLst>
   </p:timing>
@@ -29511,7 +29510,7 @@
   <p:timing>
     <p:tnLst>
       <p:par>
-        <p:cTn id="1" dur="indefinite" restart="never" nodeType="tmRoot">
+        <p:cTn xmlns:p14="http://schemas.microsoft.com/office/powerpoint/2010/main" id="1" dur="indefinite" restart="never" nodeType="tmRoot">
           <p:childTnLst>
             <p:seq concurrent="1" nextAc="seek">
               <p:cTn id="2" dur="indefinite" nodeType="mainSeq">
@@ -29996,7 +29995,7 @@
   <p:timing>
     <p:tnLst>
       <p:par>
-        <p:cTn id="1" dur="indefinite" restart="never" nodeType="tmRoot"/>
+        <p:cTn xmlns:p14="http://schemas.microsoft.com/office/powerpoint/2010/main" id="1" dur="indefinite" restart="never" nodeType="tmRoot"/>
       </p:par>
     </p:tnLst>
   </p:timing>
@@ -30133,7 +30132,7 @@
   <p:timing>
     <p:tnLst>
       <p:par>
-        <p:cTn id="1" dur="indefinite" restart="never" nodeType="tmRoot"/>
+        <p:cTn xmlns:p14="http://schemas.microsoft.com/office/powerpoint/2010/main" id="1" dur="indefinite" restart="never" nodeType="tmRoot"/>
       </p:par>
     </p:tnLst>
   </p:timing>
@@ -30190,7 +30189,7 @@
             <p:ph idx="1"/>
             <p:extLst>
               <p:ext uri="{D42A27DB-BD31-4B8C-83A1-F6EECF244321}">
-                <p14:modId xmlns:p14="http://schemas.microsoft.com/office/powerpoint/2010/main" val="2072762202"/>
+                <p14:modId xmlns:p14="http://schemas.microsoft.com/office/powerpoint/2010/main" val="145511506"/>
               </p:ext>
             </p:extLst>
           </p:nvPr>
@@ -30511,7 +30510,7 @@
   <p:timing>
     <p:tnLst>
       <p:par>
-        <p:cTn id="1" dur="indefinite" restart="never" nodeType="tmRoot"/>
+        <p:cTn xmlns:p14="http://schemas.microsoft.com/office/powerpoint/2010/main" id="1" dur="indefinite" restart="never" nodeType="tmRoot"/>
       </p:par>
     </p:tnLst>
   </p:timing>

</xml_diff>

<commit_message>
Aenderung Praesentation, Ergebnisse aus Dry Run
</commit_message>
<xml_diff>
--- a/70 Praesentation/50 StarGreg Finish.pptx
+++ b/70 Praesentation/50 StarGreg Finish.pptx
@@ -157,10 +157,10 @@
           <c:layoutTarget val="inner"/>
           <c:xMode val="edge"/>
           <c:yMode val="edge"/>
-          <c:x val="0.0602249208245362"/>
-          <c:y val="0.0983425913077632"/>
-          <c:w val="0.637940153072564"/>
-          <c:h val="0.579518310047155"/>
+          <c:x val="6.0224920824536197E-2"/>
+          <c:y val="9.8342591307763197E-2"/>
+          <c:w val="0.63794015307256402"/>
+          <c:h val="0.57951831004715504"/>
         </c:manualLayout>
       </c:layout>
       <c:lineChart>
@@ -228,34 +228,34 @@
                 <c:formatCode>General</c:formatCode>
                 <c:ptCount val="10"/>
                 <c:pt idx="0">
-                  <c:v>60.0</c:v>
+                  <c:v>60</c:v>
                 </c:pt>
                 <c:pt idx="1">
-                  <c:v>66.0</c:v>
+                  <c:v>66</c:v>
                 </c:pt>
                 <c:pt idx="2">
-                  <c:v>72.0</c:v>
+                  <c:v>72</c:v>
                 </c:pt>
                 <c:pt idx="3">
-                  <c:v>66.0</c:v>
+                  <c:v>66</c:v>
                 </c:pt>
                 <c:pt idx="4">
-                  <c:v>78.0</c:v>
+                  <c:v>78</c:v>
                 </c:pt>
                 <c:pt idx="5">
-                  <c:v>78.0</c:v>
+                  <c:v>78</c:v>
                 </c:pt>
                 <c:pt idx="6">
-                  <c:v>84.0</c:v>
+                  <c:v>84</c:v>
                 </c:pt>
                 <c:pt idx="7">
-                  <c:v>84.0</c:v>
+                  <c:v>84</c:v>
                 </c:pt>
                 <c:pt idx="8">
-                  <c:v>96.0</c:v>
+                  <c:v>96</c:v>
                 </c:pt>
                 <c:pt idx="9">
-                  <c:v>90.0</c:v>
+                  <c:v>90</c:v>
                 </c:pt>
               </c:numCache>
             </c:numRef>
@@ -324,34 +324,34 @@
                 <c:formatCode>General</c:formatCode>
                 <c:ptCount val="10"/>
                 <c:pt idx="0">
-                  <c:v>30.0</c:v>
+                  <c:v>30</c:v>
                 </c:pt>
                 <c:pt idx="1">
-                  <c:v>30.0</c:v>
+                  <c:v>30</c:v>
                 </c:pt>
                 <c:pt idx="2">
-                  <c:v>27.0</c:v>
+                  <c:v>27</c:v>
                 </c:pt>
                 <c:pt idx="3">
-                  <c:v>27.0</c:v>
+                  <c:v>27</c:v>
                 </c:pt>
                 <c:pt idx="4">
-                  <c:v>36.0</c:v>
+                  <c:v>36</c:v>
                 </c:pt>
                 <c:pt idx="5">
-                  <c:v>36.0</c:v>
+                  <c:v>36</c:v>
                 </c:pt>
                 <c:pt idx="6">
-                  <c:v>48.0</c:v>
+                  <c:v>48</c:v>
                 </c:pt>
                 <c:pt idx="7">
-                  <c:v>48.0</c:v>
+                  <c:v>48</c:v>
                 </c:pt>
                 <c:pt idx="8">
-                  <c:v>39.0</c:v>
+                  <c:v>39</c:v>
                 </c:pt>
                 <c:pt idx="9">
-                  <c:v>39.0</c:v>
+                  <c:v>39</c:v>
                 </c:pt>
               </c:numCache>
             </c:numRef>
@@ -420,34 +420,34 @@
                 <c:formatCode>General</c:formatCode>
                 <c:ptCount val="10"/>
                 <c:pt idx="0">
-                  <c:v>20.0</c:v>
+                  <c:v>20</c:v>
                 </c:pt>
                 <c:pt idx="1">
-                  <c:v>24.0</c:v>
+                  <c:v>24</c:v>
                 </c:pt>
                 <c:pt idx="2">
-                  <c:v>24.0</c:v>
+                  <c:v>24</c:v>
                 </c:pt>
                 <c:pt idx="3">
-                  <c:v>24.0</c:v>
+                  <c:v>24</c:v>
                 </c:pt>
                 <c:pt idx="4">
-                  <c:v>28.0</c:v>
+                  <c:v>28</c:v>
                 </c:pt>
                 <c:pt idx="5">
-                  <c:v>28.0</c:v>
+                  <c:v>28</c:v>
                 </c:pt>
                 <c:pt idx="6">
-                  <c:v>28.0</c:v>
+                  <c:v>28</c:v>
                 </c:pt>
                 <c:pt idx="7">
-                  <c:v>28.0</c:v>
+                  <c:v>28</c:v>
                 </c:pt>
                 <c:pt idx="8">
-                  <c:v>22.0</c:v>
+                  <c:v>22</c:v>
                 </c:pt>
                 <c:pt idx="9">
-                  <c:v>24.0</c:v>
+                  <c:v>24</c:v>
                 </c:pt>
               </c:numCache>
             </c:numRef>
@@ -692,11 +692,11 @@
         </c:dLbls>
         <c:marker val="1"/>
         <c:smooth val="0"/>
-        <c:axId val="2131864920"/>
-        <c:axId val="2131868056"/>
+        <c:axId val="48112128"/>
+        <c:axId val="78754304"/>
       </c:lineChart>
       <c:catAx>
-        <c:axId val="2131864920"/>
+        <c:axId val="48112128"/>
         <c:scaling>
           <c:orientation val="minMax"/>
         </c:scaling>
@@ -705,7 +705,7 @@
         <c:majorTickMark val="out"/>
         <c:minorTickMark val="none"/>
         <c:tickLblPos val="nextTo"/>
-        <c:crossAx val="2131868056"/>
+        <c:crossAx val="78754304"/>
         <c:crosses val="autoZero"/>
         <c:auto val="1"/>
         <c:lblAlgn val="ctr"/>
@@ -713,7 +713,7 @@
         <c:noMultiLvlLbl val="0"/>
       </c:catAx>
       <c:valAx>
-        <c:axId val="2131868056"/>
+        <c:axId val="78754304"/>
         <c:scaling>
           <c:orientation val="minMax"/>
         </c:scaling>
@@ -724,7 +724,7 @@
         <c:majorTickMark val="out"/>
         <c:minorTickMark val="none"/>
         <c:tickLblPos val="nextTo"/>
-        <c:crossAx val="2131864920"/>
+        <c:crossAx val="48112128"/>
         <c:crosses val="autoZero"/>
         <c:crossBetween val="between"/>
       </c:valAx>
@@ -7623,1060 +7623,6 @@
       <dsp:cNvGrpSpPr/>
     </dsp:nvGrpSpPr>
     <dsp:grpSpPr/>
-    <dsp:sp modelId="{AE55DD43-9428-7F41-B73D-EC2DB59DD4BA}">
-      <dsp:nvSpPr>
-        <dsp:cNvPr id="0" name=""/>
-        <dsp:cNvSpPr/>
-      </dsp:nvSpPr>
-      <dsp:spPr>
-        <a:xfrm>
-          <a:off x="5879" y="1527803"/>
-          <a:ext cx="1078694" cy="615160"/>
-        </a:xfrm>
-        <a:prstGeom prst="roundRect">
-          <a:avLst>
-            <a:gd name="adj" fmla="val 10000"/>
-          </a:avLst>
-        </a:prstGeom>
-        <a:solidFill>
-          <a:schemeClr val="accent3">
-            <a:alpha val="90000"/>
-            <a:hueOff val="0"/>
-            <a:satOff val="0"/>
-            <a:lumOff val="0"/>
-            <a:alphaOff val="0"/>
-          </a:schemeClr>
-        </a:solidFill>
-        <a:ln w="25400" cap="flat" cmpd="sng" algn="ctr">
-          <a:solidFill>
-            <a:schemeClr val="lt1">
-              <a:hueOff val="0"/>
-              <a:satOff val="0"/>
-              <a:lumOff val="0"/>
-              <a:alphaOff val="0"/>
-            </a:schemeClr>
-          </a:solidFill>
-          <a:prstDash val="solid"/>
-        </a:ln>
-        <a:effectLst/>
-      </dsp:spPr>
-      <dsp:style>
-        <a:lnRef idx="2">
-          <a:scrgbClr r="0" g="0" b="0"/>
-        </a:lnRef>
-        <a:fillRef idx="1">
-          <a:scrgbClr r="0" g="0" b="0"/>
-        </a:fillRef>
-        <a:effectRef idx="0">
-          <a:scrgbClr r="0" g="0" b="0"/>
-        </a:effectRef>
-        <a:fontRef idx="minor">
-          <a:schemeClr val="lt1"/>
-        </a:fontRef>
-      </dsp:style>
-      <dsp:txBody>
-        <a:bodyPr spcFirstLastPara="0" vert="horz" wrap="square" lIns="41910" tIns="41910" rIns="41910" bIns="41910" numCol="1" spcCol="1270" anchor="ctr" anchorCtr="0">
-          <a:noAutofit/>
-        </a:bodyPr>
-        <a:lstStyle/>
-        <a:p>
-          <a:pPr lvl="0" algn="ctr" defTabSz="488950">
-            <a:lnSpc>
-              <a:spcPct val="90000"/>
-            </a:lnSpc>
-            <a:spcBef>
-              <a:spcPct val="0"/>
-            </a:spcBef>
-            <a:spcAft>
-              <a:spcPct val="35000"/>
-            </a:spcAft>
-          </a:pPr>
-          <a:r>
-            <a:rPr lang="de-DE" sz="1100" b="1" kern="1200" dirty="0" smtClean="0">
-              <a:solidFill>
-                <a:srgbClr val="000000"/>
-              </a:solidFill>
-            </a:rPr>
-            <a:t>Unternehmen einrichten</a:t>
-          </a:r>
-          <a:endParaRPr lang="de-DE" sz="1100" b="1" kern="1200" dirty="0">
-            <a:solidFill>
-              <a:srgbClr val="000000"/>
-            </a:solidFill>
-          </a:endParaRPr>
-        </a:p>
-      </dsp:txBody>
-      <dsp:txXfrm>
-        <a:off x="23896" y="1545820"/>
-        <a:ext cx="1042660" cy="579126"/>
-      </dsp:txXfrm>
-    </dsp:sp>
-    <dsp:sp modelId="{7A0C3CCD-92B0-7F46-99CB-E288AF3BB621}">
-      <dsp:nvSpPr>
-        <dsp:cNvPr id="0" name=""/>
-        <dsp:cNvSpPr/>
-      </dsp:nvSpPr>
-      <dsp:spPr>
-        <a:xfrm>
-          <a:off x="1101704" y="1778129"/>
-          <a:ext cx="144000" cy="114508"/>
-        </a:xfrm>
-        <a:prstGeom prst="rightArrow">
-          <a:avLst>
-            <a:gd name="adj1" fmla="val 60000"/>
-            <a:gd name="adj2" fmla="val 50000"/>
-          </a:avLst>
-        </a:prstGeom>
-        <a:solidFill>
-          <a:schemeClr val="accent3">
-            <a:shade val="90000"/>
-            <a:hueOff val="0"/>
-            <a:satOff val="0"/>
-            <a:lumOff val="0"/>
-            <a:alphaOff val="0"/>
-          </a:schemeClr>
-        </a:solidFill>
-        <a:ln>
-          <a:noFill/>
-        </a:ln>
-        <a:effectLst/>
-      </dsp:spPr>
-      <dsp:style>
-        <a:lnRef idx="0">
-          <a:scrgbClr r="0" g="0" b="0"/>
-        </a:lnRef>
-        <a:fillRef idx="1">
-          <a:scrgbClr r="0" g="0" b="0"/>
-        </a:fillRef>
-        <a:effectRef idx="0">
-          <a:scrgbClr r="0" g="0" b="0"/>
-        </a:effectRef>
-        <a:fontRef idx="minor">
-          <a:schemeClr val="lt1"/>
-        </a:fontRef>
-      </dsp:style>
-      <dsp:txBody>
-        <a:bodyPr spcFirstLastPara="0" vert="horz" wrap="square" lIns="0" tIns="0" rIns="0" bIns="0" numCol="1" spcCol="1270" anchor="ctr" anchorCtr="0">
-          <a:noAutofit/>
-        </a:bodyPr>
-        <a:lstStyle/>
-        <a:p>
-          <a:pPr lvl="0" algn="ctr" defTabSz="488950">
-            <a:lnSpc>
-              <a:spcPct val="90000"/>
-            </a:lnSpc>
-            <a:spcBef>
-              <a:spcPct val="0"/>
-            </a:spcBef>
-            <a:spcAft>
-              <a:spcPct val="35000"/>
-            </a:spcAft>
-          </a:pPr>
-          <a:endParaRPr lang="de-DE" sz="1100" b="1" kern="1200">
-            <a:solidFill>
-              <a:srgbClr val="000000"/>
-            </a:solidFill>
-          </a:endParaRPr>
-        </a:p>
-      </dsp:txBody>
-      <dsp:txXfrm>
-        <a:off x="1101704" y="1801031"/>
-        <a:ext cx="109648" cy="68704"/>
-      </dsp:txXfrm>
-    </dsp:sp>
-    <dsp:sp modelId="{6B4FAB92-B09E-D84C-8D61-5D5788845DDE}">
-      <dsp:nvSpPr>
-        <dsp:cNvPr id="0" name=""/>
-        <dsp:cNvSpPr/>
-      </dsp:nvSpPr>
-      <dsp:spPr>
-        <a:xfrm>
-          <a:off x="1257643" y="1527803"/>
-          <a:ext cx="1078694" cy="615160"/>
-        </a:xfrm>
-        <a:prstGeom prst="roundRect">
-          <a:avLst>
-            <a:gd name="adj" fmla="val 10000"/>
-          </a:avLst>
-        </a:prstGeom>
-        <a:solidFill>
-          <a:schemeClr val="accent3">
-            <a:alpha val="90000"/>
-            <a:hueOff val="0"/>
-            <a:satOff val="0"/>
-            <a:lumOff val="0"/>
-            <a:alphaOff val="-6667"/>
-          </a:schemeClr>
-        </a:solidFill>
-        <a:ln w="25400" cap="flat" cmpd="sng" algn="ctr">
-          <a:solidFill>
-            <a:schemeClr val="lt1">
-              <a:hueOff val="0"/>
-              <a:satOff val="0"/>
-              <a:lumOff val="0"/>
-              <a:alphaOff val="0"/>
-            </a:schemeClr>
-          </a:solidFill>
-          <a:prstDash val="solid"/>
-        </a:ln>
-        <a:effectLst/>
-      </dsp:spPr>
-      <dsp:style>
-        <a:lnRef idx="2">
-          <a:scrgbClr r="0" g="0" b="0"/>
-        </a:lnRef>
-        <a:fillRef idx="1">
-          <a:scrgbClr r="0" g="0" b="0"/>
-        </a:fillRef>
-        <a:effectRef idx="0">
-          <a:scrgbClr r="0" g="0" b="0"/>
-        </a:effectRef>
-        <a:fontRef idx="minor">
-          <a:schemeClr val="lt1"/>
-        </a:fontRef>
-      </dsp:style>
-      <dsp:txBody>
-        <a:bodyPr spcFirstLastPara="0" vert="horz" wrap="square" lIns="41910" tIns="41910" rIns="41910" bIns="41910" numCol="1" spcCol="1270" anchor="ctr" anchorCtr="0">
-          <a:noAutofit/>
-        </a:bodyPr>
-        <a:lstStyle/>
-        <a:p>
-          <a:pPr lvl="0" algn="ctr" defTabSz="488950">
-            <a:lnSpc>
-              <a:spcPct val="90000"/>
-            </a:lnSpc>
-            <a:spcBef>
-              <a:spcPct val="0"/>
-            </a:spcBef>
-            <a:spcAft>
-              <a:spcPct val="35000"/>
-            </a:spcAft>
-          </a:pPr>
-          <a:r>
-            <a:rPr lang="de-DE" sz="1100" b="1" kern="1200" dirty="0" smtClean="0">
-              <a:solidFill>
-                <a:srgbClr val="000000"/>
-              </a:solidFill>
-            </a:rPr>
-            <a:t>Finanzen einsehen</a:t>
-          </a:r>
-          <a:endParaRPr lang="de-DE" sz="1100" b="1" kern="1200" dirty="0">
-            <a:solidFill>
-              <a:srgbClr val="000000"/>
-            </a:solidFill>
-          </a:endParaRPr>
-        </a:p>
-      </dsp:txBody>
-      <dsp:txXfrm>
-        <a:off x="1275660" y="1545820"/>
-        <a:ext cx="1042660" cy="579126"/>
-      </dsp:txXfrm>
-    </dsp:sp>
-    <dsp:sp modelId="{9D5F9421-7680-D644-9D45-AF8251FC1D83}">
-      <dsp:nvSpPr>
-        <dsp:cNvPr id="0" name=""/>
-        <dsp:cNvSpPr/>
-      </dsp:nvSpPr>
-      <dsp:spPr>
-        <a:xfrm>
-          <a:off x="2353467" y="1781731"/>
-          <a:ext cx="144000" cy="107303"/>
-        </a:xfrm>
-        <a:prstGeom prst="rightArrow">
-          <a:avLst>
-            <a:gd name="adj1" fmla="val 60000"/>
-            <a:gd name="adj2" fmla="val 50000"/>
-          </a:avLst>
-        </a:prstGeom>
-        <a:solidFill>
-          <a:schemeClr val="accent3">
-            <a:shade val="90000"/>
-            <a:hueOff val="-82658"/>
-            <a:satOff val="-6135"/>
-            <a:lumOff val="8241"/>
-            <a:alphaOff val="0"/>
-          </a:schemeClr>
-        </a:solidFill>
-        <a:ln>
-          <a:noFill/>
-        </a:ln>
-        <a:effectLst/>
-      </dsp:spPr>
-      <dsp:style>
-        <a:lnRef idx="0">
-          <a:scrgbClr r="0" g="0" b="0"/>
-        </a:lnRef>
-        <a:fillRef idx="1">
-          <a:scrgbClr r="0" g="0" b="0"/>
-        </a:fillRef>
-        <a:effectRef idx="0">
-          <a:scrgbClr r="0" g="0" b="0"/>
-        </a:effectRef>
-        <a:fontRef idx="minor">
-          <a:schemeClr val="lt1"/>
-        </a:fontRef>
-      </dsp:style>
-      <dsp:txBody>
-        <a:bodyPr spcFirstLastPara="0" vert="horz" wrap="square" lIns="0" tIns="0" rIns="0" bIns="0" numCol="1" spcCol="1270" anchor="ctr" anchorCtr="0">
-          <a:noAutofit/>
-        </a:bodyPr>
-        <a:lstStyle/>
-        <a:p>
-          <a:pPr lvl="0" algn="ctr" defTabSz="488950">
-            <a:lnSpc>
-              <a:spcPct val="90000"/>
-            </a:lnSpc>
-            <a:spcBef>
-              <a:spcPct val="0"/>
-            </a:spcBef>
-            <a:spcAft>
-              <a:spcPct val="35000"/>
-            </a:spcAft>
-          </a:pPr>
-          <a:endParaRPr lang="de-DE" sz="1100" b="1" kern="1200">
-            <a:solidFill>
-              <a:srgbClr val="000000"/>
-            </a:solidFill>
-          </a:endParaRPr>
-        </a:p>
-      </dsp:txBody>
-      <dsp:txXfrm>
-        <a:off x="2353467" y="1803192"/>
-        <a:ext cx="111809" cy="64381"/>
-      </dsp:txXfrm>
-    </dsp:sp>
-    <dsp:sp modelId="{6D5F24C4-C754-0346-9A17-9000437579E8}">
-      <dsp:nvSpPr>
-        <dsp:cNvPr id="0" name=""/>
-        <dsp:cNvSpPr/>
-      </dsp:nvSpPr>
-      <dsp:spPr>
-        <a:xfrm>
-          <a:off x="2509406" y="1527803"/>
-          <a:ext cx="1078694" cy="615160"/>
-        </a:xfrm>
-        <a:prstGeom prst="roundRect">
-          <a:avLst>
-            <a:gd name="adj" fmla="val 10000"/>
-          </a:avLst>
-        </a:prstGeom>
-        <a:solidFill>
-          <a:schemeClr val="accent3">
-            <a:alpha val="90000"/>
-            <a:hueOff val="0"/>
-            <a:satOff val="0"/>
-            <a:lumOff val="0"/>
-            <a:alphaOff val="-13333"/>
-          </a:schemeClr>
-        </a:solidFill>
-        <a:ln w="25400" cap="flat" cmpd="sng" algn="ctr">
-          <a:solidFill>
-            <a:schemeClr val="lt1">
-              <a:hueOff val="0"/>
-              <a:satOff val="0"/>
-              <a:lumOff val="0"/>
-              <a:alphaOff val="0"/>
-            </a:schemeClr>
-          </a:solidFill>
-          <a:prstDash val="solid"/>
-        </a:ln>
-        <a:effectLst/>
-      </dsp:spPr>
-      <dsp:style>
-        <a:lnRef idx="2">
-          <a:scrgbClr r="0" g="0" b="0"/>
-        </a:lnRef>
-        <a:fillRef idx="1">
-          <a:scrgbClr r="0" g="0" b="0"/>
-        </a:fillRef>
-        <a:effectRef idx="0">
-          <a:scrgbClr r="0" g="0" b="0"/>
-        </a:effectRef>
-        <a:fontRef idx="minor">
-          <a:schemeClr val="lt1"/>
-        </a:fontRef>
-      </dsp:style>
-      <dsp:txBody>
-        <a:bodyPr spcFirstLastPara="0" vert="horz" wrap="square" lIns="41910" tIns="41910" rIns="41910" bIns="41910" numCol="1" spcCol="1270" anchor="ctr" anchorCtr="0">
-          <a:noAutofit/>
-        </a:bodyPr>
-        <a:lstStyle/>
-        <a:p>
-          <a:pPr lvl="0" algn="ctr" defTabSz="488950">
-            <a:lnSpc>
-              <a:spcPct val="90000"/>
-            </a:lnSpc>
-            <a:spcBef>
-              <a:spcPct val="0"/>
-            </a:spcBef>
-            <a:spcAft>
-              <a:spcPct val="35000"/>
-            </a:spcAft>
-          </a:pPr>
-          <a:r>
-            <a:rPr lang="de-DE" sz="1100" b="1" kern="1200" dirty="0" smtClean="0">
-              <a:solidFill>
-                <a:srgbClr val="000000"/>
-              </a:solidFill>
-            </a:rPr>
-            <a:t>Einkauf von Bauteilen</a:t>
-          </a:r>
-          <a:endParaRPr lang="de-DE" sz="1100" b="1" kern="1200" dirty="0">
-            <a:solidFill>
-              <a:srgbClr val="000000"/>
-            </a:solidFill>
-          </a:endParaRPr>
-        </a:p>
-      </dsp:txBody>
-      <dsp:txXfrm>
-        <a:off x="2527423" y="1545820"/>
-        <a:ext cx="1042660" cy="579126"/>
-      </dsp:txXfrm>
-    </dsp:sp>
-    <dsp:sp modelId="{2CDEA237-215F-6048-A36D-CA48F653B9F0}">
-      <dsp:nvSpPr>
-        <dsp:cNvPr id="0" name=""/>
-        <dsp:cNvSpPr/>
-      </dsp:nvSpPr>
-      <dsp:spPr>
-        <a:xfrm>
-          <a:off x="3605231" y="1781731"/>
-          <a:ext cx="144000" cy="107303"/>
-        </a:xfrm>
-        <a:prstGeom prst="rightArrow">
-          <a:avLst>
-            <a:gd name="adj1" fmla="val 60000"/>
-            <a:gd name="adj2" fmla="val 50000"/>
-          </a:avLst>
-        </a:prstGeom>
-        <a:solidFill>
-          <a:schemeClr val="accent3">
-            <a:shade val="90000"/>
-            <a:hueOff val="-165316"/>
-            <a:satOff val="-12270"/>
-            <a:lumOff val="16482"/>
-            <a:alphaOff val="0"/>
-          </a:schemeClr>
-        </a:solidFill>
-        <a:ln>
-          <a:noFill/>
-        </a:ln>
-        <a:effectLst/>
-      </dsp:spPr>
-      <dsp:style>
-        <a:lnRef idx="0">
-          <a:scrgbClr r="0" g="0" b="0"/>
-        </a:lnRef>
-        <a:fillRef idx="1">
-          <a:scrgbClr r="0" g="0" b="0"/>
-        </a:fillRef>
-        <a:effectRef idx="0">
-          <a:scrgbClr r="0" g="0" b="0"/>
-        </a:effectRef>
-        <a:fontRef idx="minor">
-          <a:schemeClr val="lt1"/>
-        </a:fontRef>
-      </dsp:style>
-      <dsp:txBody>
-        <a:bodyPr spcFirstLastPara="0" vert="horz" wrap="square" lIns="0" tIns="0" rIns="0" bIns="0" numCol="1" spcCol="1270" anchor="ctr" anchorCtr="0">
-          <a:noAutofit/>
-        </a:bodyPr>
-        <a:lstStyle/>
-        <a:p>
-          <a:pPr lvl="0" algn="ctr" defTabSz="488950">
-            <a:lnSpc>
-              <a:spcPct val="90000"/>
-            </a:lnSpc>
-            <a:spcBef>
-              <a:spcPct val="0"/>
-            </a:spcBef>
-            <a:spcAft>
-              <a:spcPct val="35000"/>
-            </a:spcAft>
-          </a:pPr>
-          <a:endParaRPr lang="de-DE" sz="1100" b="1" kern="1200">
-            <a:solidFill>
-              <a:srgbClr val="000000"/>
-            </a:solidFill>
-          </a:endParaRPr>
-        </a:p>
-      </dsp:txBody>
-      <dsp:txXfrm>
-        <a:off x="3605231" y="1803192"/>
-        <a:ext cx="111809" cy="64381"/>
-      </dsp:txXfrm>
-    </dsp:sp>
-    <dsp:sp modelId="{EF9A7DCF-E5B0-2C49-805A-AC2B4B728B76}">
-      <dsp:nvSpPr>
-        <dsp:cNvPr id="0" name=""/>
-        <dsp:cNvSpPr/>
-      </dsp:nvSpPr>
-      <dsp:spPr>
-        <a:xfrm>
-          <a:off x="3761170" y="1527803"/>
-          <a:ext cx="1078694" cy="615160"/>
-        </a:xfrm>
-        <a:prstGeom prst="roundRect">
-          <a:avLst>
-            <a:gd name="adj" fmla="val 10000"/>
-          </a:avLst>
-        </a:prstGeom>
-        <a:solidFill>
-          <a:schemeClr val="accent3">
-            <a:alpha val="90000"/>
-            <a:hueOff val="0"/>
-            <a:satOff val="0"/>
-            <a:lumOff val="0"/>
-            <a:alphaOff val="-20000"/>
-          </a:schemeClr>
-        </a:solidFill>
-        <a:ln w="25400" cap="flat" cmpd="sng" algn="ctr">
-          <a:solidFill>
-            <a:schemeClr val="lt1">
-              <a:hueOff val="0"/>
-              <a:satOff val="0"/>
-              <a:lumOff val="0"/>
-              <a:alphaOff val="0"/>
-            </a:schemeClr>
-          </a:solidFill>
-          <a:prstDash val="solid"/>
-        </a:ln>
-        <a:effectLst/>
-      </dsp:spPr>
-      <dsp:style>
-        <a:lnRef idx="2">
-          <a:scrgbClr r="0" g="0" b="0"/>
-        </a:lnRef>
-        <a:fillRef idx="1">
-          <a:scrgbClr r="0" g="0" b="0"/>
-        </a:fillRef>
-        <a:effectRef idx="0">
-          <a:scrgbClr r="0" g="0" b="0"/>
-        </a:effectRef>
-        <a:fontRef idx="minor">
-          <a:schemeClr val="lt1"/>
-        </a:fontRef>
-      </dsp:style>
-      <dsp:txBody>
-        <a:bodyPr spcFirstLastPara="0" vert="horz" wrap="square" lIns="41910" tIns="41910" rIns="41910" bIns="41910" numCol="1" spcCol="1270" anchor="ctr" anchorCtr="0">
-          <a:noAutofit/>
-        </a:bodyPr>
-        <a:lstStyle/>
-        <a:p>
-          <a:pPr lvl="0" algn="ctr" defTabSz="488950">
-            <a:lnSpc>
-              <a:spcPct val="90000"/>
-            </a:lnSpc>
-            <a:spcBef>
-              <a:spcPct val="0"/>
-            </a:spcBef>
-            <a:spcAft>
-              <a:spcPct val="35000"/>
-            </a:spcAft>
-          </a:pPr>
-          <a:r>
-            <a:rPr lang="de-DE" sz="1100" b="1" kern="1200" dirty="0" smtClean="0">
-              <a:solidFill>
-                <a:srgbClr val="000000"/>
-              </a:solidFill>
-            </a:rPr>
-            <a:t>Personal verwalten</a:t>
-          </a:r>
-          <a:endParaRPr lang="de-DE" sz="1100" b="1" kern="1200" dirty="0">
-            <a:solidFill>
-              <a:srgbClr val="000000"/>
-            </a:solidFill>
-          </a:endParaRPr>
-        </a:p>
-      </dsp:txBody>
-      <dsp:txXfrm>
-        <a:off x="3779187" y="1545820"/>
-        <a:ext cx="1042660" cy="579126"/>
-      </dsp:txXfrm>
-    </dsp:sp>
-    <dsp:sp modelId="{3A5AC82B-7463-1047-85AB-EC94B837835A}">
-      <dsp:nvSpPr>
-        <dsp:cNvPr id="0" name=""/>
-        <dsp:cNvSpPr/>
-      </dsp:nvSpPr>
-      <dsp:spPr>
-        <a:xfrm>
-          <a:off x="4856995" y="1781731"/>
-          <a:ext cx="144000" cy="107303"/>
-        </a:xfrm>
-        <a:prstGeom prst="rightArrow">
-          <a:avLst>
-            <a:gd name="adj1" fmla="val 60000"/>
-            <a:gd name="adj2" fmla="val 50000"/>
-          </a:avLst>
-        </a:prstGeom>
-        <a:solidFill>
-          <a:schemeClr val="accent3">
-            <a:shade val="90000"/>
-            <a:hueOff val="-247974"/>
-            <a:satOff val="-18406"/>
-            <a:lumOff val="24723"/>
-            <a:alphaOff val="0"/>
-          </a:schemeClr>
-        </a:solidFill>
-        <a:ln>
-          <a:noFill/>
-        </a:ln>
-        <a:effectLst/>
-      </dsp:spPr>
-      <dsp:style>
-        <a:lnRef idx="0">
-          <a:scrgbClr r="0" g="0" b="0"/>
-        </a:lnRef>
-        <a:fillRef idx="1">
-          <a:scrgbClr r="0" g="0" b="0"/>
-        </a:fillRef>
-        <a:effectRef idx="0">
-          <a:scrgbClr r="0" g="0" b="0"/>
-        </a:effectRef>
-        <a:fontRef idx="minor">
-          <a:schemeClr val="lt1"/>
-        </a:fontRef>
-      </dsp:style>
-      <dsp:txBody>
-        <a:bodyPr spcFirstLastPara="0" vert="horz" wrap="square" lIns="0" tIns="0" rIns="0" bIns="0" numCol="1" spcCol="1270" anchor="ctr" anchorCtr="0">
-          <a:noAutofit/>
-        </a:bodyPr>
-        <a:lstStyle/>
-        <a:p>
-          <a:pPr lvl="0" algn="ctr" defTabSz="488950">
-            <a:lnSpc>
-              <a:spcPct val="90000"/>
-            </a:lnSpc>
-            <a:spcBef>
-              <a:spcPct val="0"/>
-            </a:spcBef>
-            <a:spcAft>
-              <a:spcPct val="35000"/>
-            </a:spcAft>
-          </a:pPr>
-          <a:endParaRPr lang="de-DE" sz="1100" b="1" kern="1200">
-            <a:solidFill>
-              <a:srgbClr val="000000"/>
-            </a:solidFill>
-          </a:endParaRPr>
-        </a:p>
-      </dsp:txBody>
-      <dsp:txXfrm>
-        <a:off x="4856995" y="1803192"/>
-        <a:ext cx="111809" cy="64381"/>
-      </dsp:txXfrm>
-    </dsp:sp>
-    <dsp:sp modelId="{E9040923-0347-3940-94B6-75FF8AF184B0}">
-      <dsp:nvSpPr>
-        <dsp:cNvPr id="0" name=""/>
-        <dsp:cNvSpPr/>
-      </dsp:nvSpPr>
-      <dsp:spPr>
-        <a:xfrm>
-          <a:off x="5012934" y="1527803"/>
-          <a:ext cx="1078694" cy="615160"/>
-        </a:xfrm>
-        <a:prstGeom prst="roundRect">
-          <a:avLst>
-            <a:gd name="adj" fmla="val 10000"/>
-          </a:avLst>
-        </a:prstGeom>
-        <a:solidFill>
-          <a:schemeClr val="accent3">
-            <a:alpha val="90000"/>
-            <a:hueOff val="0"/>
-            <a:satOff val="0"/>
-            <a:lumOff val="0"/>
-            <a:alphaOff val="-26667"/>
-          </a:schemeClr>
-        </a:solidFill>
-        <a:ln w="25400" cap="flat" cmpd="sng" algn="ctr">
-          <a:solidFill>
-            <a:schemeClr val="lt1">
-              <a:hueOff val="0"/>
-              <a:satOff val="0"/>
-              <a:lumOff val="0"/>
-              <a:alphaOff val="0"/>
-            </a:schemeClr>
-          </a:solidFill>
-          <a:prstDash val="solid"/>
-        </a:ln>
-        <a:effectLst/>
-      </dsp:spPr>
-      <dsp:style>
-        <a:lnRef idx="2">
-          <a:scrgbClr r="0" g="0" b="0"/>
-        </a:lnRef>
-        <a:fillRef idx="1">
-          <a:scrgbClr r="0" g="0" b="0"/>
-        </a:fillRef>
-        <a:effectRef idx="0">
-          <a:scrgbClr r="0" g="0" b="0"/>
-        </a:effectRef>
-        <a:fontRef idx="minor">
-          <a:schemeClr val="lt1"/>
-        </a:fontRef>
-      </dsp:style>
-      <dsp:txBody>
-        <a:bodyPr spcFirstLastPara="0" vert="horz" wrap="square" lIns="41910" tIns="41910" rIns="41910" bIns="41910" numCol="1" spcCol="1270" anchor="ctr" anchorCtr="0">
-          <a:noAutofit/>
-        </a:bodyPr>
-        <a:lstStyle/>
-        <a:p>
-          <a:pPr lvl="0" algn="ctr" defTabSz="488950">
-            <a:lnSpc>
-              <a:spcPct val="90000"/>
-            </a:lnSpc>
-            <a:spcBef>
-              <a:spcPct val="0"/>
-            </a:spcBef>
-            <a:spcAft>
-              <a:spcPct val="35000"/>
-            </a:spcAft>
-          </a:pPr>
-          <a:r>
-            <a:rPr lang="de-DE" sz="1100" b="1" kern="1200" dirty="0" smtClean="0">
-              <a:solidFill>
-                <a:srgbClr val="000000"/>
-              </a:solidFill>
-            </a:rPr>
-            <a:t>Raumschiffe produzieren</a:t>
-          </a:r>
-          <a:endParaRPr lang="de-DE" sz="1100" b="1" kern="1200" dirty="0">
-            <a:solidFill>
-              <a:srgbClr val="000000"/>
-            </a:solidFill>
-          </a:endParaRPr>
-        </a:p>
-      </dsp:txBody>
-      <dsp:txXfrm>
-        <a:off x="5030951" y="1545820"/>
-        <a:ext cx="1042660" cy="579126"/>
-      </dsp:txXfrm>
-    </dsp:sp>
-    <dsp:sp modelId="{B81F8AF9-FF83-714C-9CEE-E2E108C4A052}">
-      <dsp:nvSpPr>
-        <dsp:cNvPr id="0" name=""/>
-        <dsp:cNvSpPr/>
-      </dsp:nvSpPr>
-      <dsp:spPr>
-        <a:xfrm>
-          <a:off x="6108759" y="1781731"/>
-          <a:ext cx="144000" cy="107303"/>
-        </a:xfrm>
-        <a:prstGeom prst="rightArrow">
-          <a:avLst>
-            <a:gd name="adj1" fmla="val 60000"/>
-            <a:gd name="adj2" fmla="val 50000"/>
-          </a:avLst>
-        </a:prstGeom>
-        <a:solidFill>
-          <a:schemeClr val="accent3">
-            <a:shade val="90000"/>
-            <a:hueOff val="-330632"/>
-            <a:satOff val="-24541"/>
-            <a:lumOff val="32964"/>
-            <a:alphaOff val="0"/>
-          </a:schemeClr>
-        </a:solidFill>
-        <a:ln>
-          <a:noFill/>
-        </a:ln>
-        <a:effectLst/>
-      </dsp:spPr>
-      <dsp:style>
-        <a:lnRef idx="0">
-          <a:scrgbClr r="0" g="0" b="0"/>
-        </a:lnRef>
-        <a:fillRef idx="1">
-          <a:scrgbClr r="0" g="0" b="0"/>
-        </a:fillRef>
-        <a:effectRef idx="0">
-          <a:scrgbClr r="0" g="0" b="0"/>
-        </a:effectRef>
-        <a:fontRef idx="minor">
-          <a:schemeClr val="lt1"/>
-        </a:fontRef>
-      </dsp:style>
-      <dsp:txBody>
-        <a:bodyPr spcFirstLastPara="0" vert="horz" wrap="square" lIns="0" tIns="0" rIns="0" bIns="0" numCol="1" spcCol="1270" anchor="ctr" anchorCtr="0">
-          <a:noAutofit/>
-        </a:bodyPr>
-        <a:lstStyle/>
-        <a:p>
-          <a:pPr lvl="0" algn="ctr" defTabSz="488950">
-            <a:lnSpc>
-              <a:spcPct val="90000"/>
-            </a:lnSpc>
-            <a:spcBef>
-              <a:spcPct val="0"/>
-            </a:spcBef>
-            <a:spcAft>
-              <a:spcPct val="35000"/>
-            </a:spcAft>
-          </a:pPr>
-          <a:endParaRPr lang="de-DE" sz="1100" b="1" kern="1200">
-            <a:solidFill>
-              <a:srgbClr val="000000"/>
-            </a:solidFill>
-          </a:endParaRPr>
-        </a:p>
-      </dsp:txBody>
-      <dsp:txXfrm>
-        <a:off x="6108759" y="1803192"/>
-        <a:ext cx="111809" cy="64381"/>
-      </dsp:txXfrm>
-    </dsp:sp>
-    <dsp:sp modelId="{8B2FAF1A-C258-A84D-B1E1-138BBC85B83B}">
-      <dsp:nvSpPr>
-        <dsp:cNvPr id="0" name=""/>
-        <dsp:cNvSpPr/>
-      </dsp:nvSpPr>
-      <dsp:spPr>
-        <a:xfrm>
-          <a:off x="6264697" y="1527803"/>
-          <a:ext cx="1078694" cy="615160"/>
-        </a:xfrm>
-        <a:prstGeom prst="roundRect">
-          <a:avLst>
-            <a:gd name="adj" fmla="val 10000"/>
-          </a:avLst>
-        </a:prstGeom>
-        <a:solidFill>
-          <a:schemeClr val="accent3">
-            <a:alpha val="90000"/>
-            <a:hueOff val="0"/>
-            <a:satOff val="0"/>
-            <a:lumOff val="0"/>
-            <a:alphaOff val="-33333"/>
-          </a:schemeClr>
-        </a:solidFill>
-        <a:ln w="25400" cap="flat" cmpd="sng" algn="ctr">
-          <a:solidFill>
-            <a:schemeClr val="lt1">
-              <a:hueOff val="0"/>
-              <a:satOff val="0"/>
-              <a:lumOff val="0"/>
-              <a:alphaOff val="0"/>
-            </a:schemeClr>
-          </a:solidFill>
-          <a:prstDash val="solid"/>
-        </a:ln>
-        <a:effectLst/>
-      </dsp:spPr>
-      <dsp:style>
-        <a:lnRef idx="2">
-          <a:scrgbClr r="0" g="0" b="0"/>
-        </a:lnRef>
-        <a:fillRef idx="1">
-          <a:scrgbClr r="0" g="0" b="0"/>
-        </a:fillRef>
-        <a:effectRef idx="0">
-          <a:scrgbClr r="0" g="0" b="0"/>
-        </a:effectRef>
-        <a:fontRef idx="minor">
-          <a:schemeClr val="lt1"/>
-        </a:fontRef>
-      </dsp:style>
-      <dsp:txBody>
-        <a:bodyPr spcFirstLastPara="0" vert="horz" wrap="square" lIns="41910" tIns="41910" rIns="41910" bIns="41910" numCol="1" spcCol="1270" anchor="ctr" anchorCtr="0">
-          <a:noAutofit/>
-        </a:bodyPr>
-        <a:lstStyle/>
-        <a:p>
-          <a:pPr lvl="0" algn="ctr" defTabSz="488950">
-            <a:lnSpc>
-              <a:spcPct val="90000"/>
-            </a:lnSpc>
-            <a:spcBef>
-              <a:spcPct val="0"/>
-            </a:spcBef>
-            <a:spcAft>
-              <a:spcPct val="35000"/>
-            </a:spcAft>
-          </a:pPr>
-          <a:r>
-            <a:rPr lang="de-DE" sz="1100" b="1" kern="1200" dirty="0" smtClean="0">
-              <a:solidFill>
-                <a:srgbClr val="000000"/>
-              </a:solidFill>
-            </a:rPr>
-            <a:t>Verkaufspreis angeben</a:t>
-          </a:r>
-          <a:endParaRPr lang="de-DE" sz="1100" b="1" kern="1200" dirty="0">
-            <a:solidFill>
-              <a:srgbClr val="000000"/>
-            </a:solidFill>
-          </a:endParaRPr>
-        </a:p>
-      </dsp:txBody>
-      <dsp:txXfrm>
-        <a:off x="6282714" y="1545820"/>
-        <a:ext cx="1042660" cy="579126"/>
-      </dsp:txXfrm>
-    </dsp:sp>
-    <dsp:sp modelId="{337DA1A1-C713-7A4B-9877-A8F9D2567B3E}">
-      <dsp:nvSpPr>
-        <dsp:cNvPr id="0" name=""/>
-        <dsp:cNvSpPr/>
-      </dsp:nvSpPr>
-      <dsp:spPr>
-        <a:xfrm>
-          <a:off x="7360522" y="1781731"/>
-          <a:ext cx="144000" cy="107303"/>
-        </a:xfrm>
-        <a:prstGeom prst="rightArrow">
-          <a:avLst>
-            <a:gd name="adj1" fmla="val 60000"/>
-            <a:gd name="adj2" fmla="val 50000"/>
-          </a:avLst>
-        </a:prstGeom>
-        <a:solidFill>
-          <a:schemeClr val="accent3">
-            <a:shade val="90000"/>
-            <a:hueOff val="-413290"/>
-            <a:satOff val="-30676"/>
-            <a:lumOff val="41205"/>
-            <a:alphaOff val="0"/>
-          </a:schemeClr>
-        </a:solidFill>
-        <a:ln>
-          <a:noFill/>
-        </a:ln>
-        <a:effectLst/>
-      </dsp:spPr>
-      <dsp:style>
-        <a:lnRef idx="0">
-          <a:scrgbClr r="0" g="0" b="0"/>
-        </a:lnRef>
-        <a:fillRef idx="1">
-          <a:scrgbClr r="0" g="0" b="0"/>
-        </a:fillRef>
-        <a:effectRef idx="0">
-          <a:scrgbClr r="0" g="0" b="0"/>
-        </a:effectRef>
-        <a:fontRef idx="minor">
-          <a:schemeClr val="lt1"/>
-        </a:fontRef>
-      </dsp:style>
-      <dsp:txBody>
-        <a:bodyPr spcFirstLastPara="0" vert="horz" wrap="square" lIns="0" tIns="0" rIns="0" bIns="0" numCol="1" spcCol="1270" anchor="ctr" anchorCtr="0">
-          <a:noAutofit/>
-        </a:bodyPr>
-        <a:lstStyle/>
-        <a:p>
-          <a:pPr lvl="0" algn="ctr" defTabSz="488950">
-            <a:lnSpc>
-              <a:spcPct val="90000"/>
-            </a:lnSpc>
-            <a:spcBef>
-              <a:spcPct val="0"/>
-            </a:spcBef>
-            <a:spcAft>
-              <a:spcPct val="35000"/>
-            </a:spcAft>
-          </a:pPr>
-          <a:endParaRPr lang="de-DE" sz="1100" b="1" kern="1200">
-            <a:solidFill>
-              <a:srgbClr val="000000"/>
-            </a:solidFill>
-          </a:endParaRPr>
-        </a:p>
-      </dsp:txBody>
-      <dsp:txXfrm>
-        <a:off x="7360522" y="1803192"/>
-        <a:ext cx="111809" cy="64381"/>
-      </dsp:txXfrm>
-    </dsp:sp>
-    <dsp:sp modelId="{E9DC2F37-07D7-4447-BB56-EA2233686C2B}">
-      <dsp:nvSpPr>
-        <dsp:cNvPr id="0" name=""/>
-        <dsp:cNvSpPr/>
-      </dsp:nvSpPr>
-      <dsp:spPr>
-        <a:xfrm>
-          <a:off x="7516461" y="1527803"/>
-          <a:ext cx="1078694" cy="615160"/>
-        </a:xfrm>
-        <a:prstGeom prst="roundRect">
-          <a:avLst>
-            <a:gd name="adj" fmla="val 10000"/>
-          </a:avLst>
-        </a:prstGeom>
-        <a:solidFill>
-          <a:schemeClr val="accent3">
-            <a:alpha val="90000"/>
-            <a:hueOff val="0"/>
-            <a:satOff val="0"/>
-            <a:lumOff val="0"/>
-            <a:alphaOff val="-40000"/>
-          </a:schemeClr>
-        </a:solidFill>
-        <a:ln w="25400" cap="flat" cmpd="sng" algn="ctr">
-          <a:solidFill>
-            <a:schemeClr val="lt1">
-              <a:hueOff val="0"/>
-              <a:satOff val="0"/>
-              <a:lumOff val="0"/>
-              <a:alphaOff val="0"/>
-            </a:schemeClr>
-          </a:solidFill>
-          <a:prstDash val="solid"/>
-        </a:ln>
-        <a:effectLst/>
-      </dsp:spPr>
-      <dsp:style>
-        <a:lnRef idx="2">
-          <a:scrgbClr r="0" g="0" b="0"/>
-        </a:lnRef>
-        <a:fillRef idx="1">
-          <a:scrgbClr r="0" g="0" b="0"/>
-        </a:fillRef>
-        <a:effectRef idx="0">
-          <a:scrgbClr r="0" g="0" b="0"/>
-        </a:effectRef>
-        <a:fontRef idx="minor">
-          <a:schemeClr val="lt1"/>
-        </a:fontRef>
-      </dsp:style>
-      <dsp:txBody>
-        <a:bodyPr spcFirstLastPara="0" vert="horz" wrap="square" lIns="41910" tIns="41910" rIns="41910" bIns="41910" numCol="1" spcCol="1270" anchor="ctr" anchorCtr="0">
-          <a:noAutofit/>
-        </a:bodyPr>
-        <a:lstStyle/>
-        <a:p>
-          <a:pPr lvl="0" algn="ctr" defTabSz="488950">
-            <a:lnSpc>
-              <a:spcPct val="90000"/>
-            </a:lnSpc>
-            <a:spcBef>
-              <a:spcPct val="0"/>
-            </a:spcBef>
-            <a:spcAft>
-              <a:spcPct val="35000"/>
-            </a:spcAft>
-          </a:pPr>
-          <a:r>
-            <a:rPr lang="de-DE" sz="1100" b="1" kern="1200" dirty="0" smtClean="0">
-              <a:solidFill>
-                <a:srgbClr val="000000"/>
-              </a:solidFill>
-            </a:rPr>
-            <a:t>End-bewertung einsehen</a:t>
-          </a:r>
-          <a:endParaRPr lang="de-DE" sz="1100" b="1" kern="1200" dirty="0">
-            <a:solidFill>
-              <a:srgbClr val="000000"/>
-            </a:solidFill>
-          </a:endParaRPr>
-        </a:p>
-      </dsp:txBody>
-      <dsp:txXfrm>
-        <a:off x="7534478" y="1545820"/>
-        <a:ext cx="1042660" cy="579126"/>
-      </dsp:txXfrm>
-    </dsp:sp>
   </dsp:spTree>
 </dsp:drawing>
 </file>
@@ -13871,7 +12817,7 @@
           <a:p>
             <a:fld id="{27667466-E0D7-FD4B-BBEF-602BF6B185FF}" type="datetimeFigureOut">
               <a:rPr lang="de-DE" smtClean="0"/>
-              <a:t>07.11.11</a:t>
+              <a:t>09.11.2011</a:t>
             </a:fld>
             <a:endParaRPr lang="de-DE"/>
           </a:p>
@@ -14037,7 +12983,7 @@
           <a:p>
             <a:fld id="{358CF69D-E791-E447-927B-A50D3ED4596D}" type="datetimeFigureOut">
               <a:rPr lang="de-DE" smtClean="0"/>
-              <a:t>07.11.11</a:t>
+              <a:t>09.11.2011</a:t>
             </a:fld>
             <a:endParaRPr lang="de-DE"/>
           </a:p>
@@ -20518,7 +19464,7 @@
   <p:timing>
     <p:tnLst>
       <p:par>
-        <p:cTn xmlns:p14="http://schemas.microsoft.com/office/powerpoint/2010/main" id="1" dur="indefinite" restart="never" nodeType="tmRoot"/>
+        <p:cTn id="1" dur="indefinite" restart="never" nodeType="tmRoot"/>
       </p:par>
     </p:tnLst>
   </p:timing>
@@ -20647,7 +19593,7 @@
           <p:nvPr/>
         </p:nvPicPr>
         <p:blipFill>
-          <a:blip r:embed="rId2">
+          <a:blip r:embed="rId2" cstate="email">
             <a:extLst>
               <a:ext uri="{28A0092B-C50C-407E-A947-70E740481C1C}">
                 <a14:useLocalDpi xmlns:a14="http://schemas.microsoft.com/office/drawing/2010/main" val="0"/>
@@ -20681,7 +19627,7 @@
   <p:timing>
     <p:tnLst>
       <p:par>
-        <p:cTn xmlns:p14="http://schemas.microsoft.com/office/powerpoint/2010/main" id="1" dur="indefinite" restart="never" nodeType="tmRoot"/>
+        <p:cTn id="1" dur="indefinite" restart="never" nodeType="tmRoot"/>
       </p:par>
     </p:tnLst>
   </p:timing>
@@ -20959,7 +19905,7 @@
   <p:timing>
     <p:tnLst>
       <p:par>
-        <p:cTn xmlns:p14="http://schemas.microsoft.com/office/powerpoint/2010/main" id="1" dur="indefinite" restart="never" nodeType="tmRoot"/>
+        <p:cTn id="1" dur="indefinite" restart="never" nodeType="tmRoot"/>
       </p:par>
     </p:tnLst>
   </p:timing>
@@ -20992,7 +19938,7 @@
           <p:nvPr/>
         </p:nvPicPr>
         <p:blipFill rotWithShape="1">
-          <a:blip r:embed="rId2">
+          <a:blip r:embed="rId2" cstate="email">
             <a:extLst>
               <a:ext uri="{28A0092B-C50C-407E-A947-70E740481C1C}">
                 <a14:useLocalDpi xmlns:a14="http://schemas.microsoft.com/office/drawing/2010/main" val="0"/>
@@ -21280,7 +20226,7 @@
   <p:timing>
     <p:tnLst>
       <p:par>
-        <p:cTn xmlns:p14="http://schemas.microsoft.com/office/powerpoint/2010/main" id="1" dur="indefinite" restart="never" nodeType="tmRoot"/>
+        <p:cTn id="1" dur="indefinite" restart="never" nodeType="tmRoot"/>
       </p:par>
     </p:tnLst>
   </p:timing>
@@ -21417,7 +20363,7 @@
   <p:timing>
     <p:tnLst>
       <p:par>
-        <p:cTn xmlns:p14="http://schemas.microsoft.com/office/powerpoint/2010/main" id="1" dur="indefinite" restart="never" nodeType="tmRoot"/>
+        <p:cTn id="1" dur="indefinite" restart="never" nodeType="tmRoot"/>
       </p:par>
     </p:tnLst>
   </p:timing>
@@ -21551,7 +20497,7 @@
   <p:timing>
     <p:tnLst>
       <p:par>
-        <p:cTn xmlns:p14="http://schemas.microsoft.com/office/powerpoint/2010/main" id="1" dur="indefinite" restart="never" nodeType="tmRoot"/>
+        <p:cTn id="1" dur="indefinite" restart="never" nodeType="tmRoot"/>
       </p:par>
     </p:tnLst>
   </p:timing>
@@ -21685,7 +20631,7 @@
   <p:timing>
     <p:tnLst>
       <p:par>
-        <p:cTn xmlns:p14="http://schemas.microsoft.com/office/powerpoint/2010/main" id="1" dur="indefinite" restart="never" nodeType="tmRoot"/>
+        <p:cTn id="1" dur="indefinite" restart="never" nodeType="tmRoot"/>
       </p:par>
     </p:tnLst>
   </p:timing>
@@ -21819,7 +20765,7 @@
   <p:timing>
     <p:tnLst>
       <p:par>
-        <p:cTn xmlns:p14="http://schemas.microsoft.com/office/powerpoint/2010/main" id="1" dur="indefinite" restart="never" nodeType="tmRoot"/>
+        <p:cTn id="1" dur="indefinite" restart="never" nodeType="tmRoot"/>
       </p:par>
     </p:tnLst>
   </p:timing>
@@ -21956,7 +20902,7 @@
   <p:timing>
     <p:tnLst>
       <p:par>
-        <p:cTn xmlns:p14="http://schemas.microsoft.com/office/powerpoint/2010/main" id="1" dur="indefinite" restart="never" nodeType="tmRoot"/>
+        <p:cTn id="1" dur="indefinite" restart="never" nodeType="tmRoot"/>
       </p:par>
     </p:tnLst>
   </p:timing>
@@ -23938,7 +22884,7 @@
   <p:timing>
     <p:tnLst>
       <p:par>
-        <p:cTn xmlns:p14="http://schemas.microsoft.com/office/powerpoint/2010/main" id="1" dur="indefinite" restart="never" nodeType="tmRoot">
+        <p:cTn id="1" dur="indefinite" restart="never" nodeType="tmRoot">
           <p:childTnLst>
             <p:seq concurrent="1" nextAc="seek">
               <p:cTn id="2" dur="indefinite" nodeType="mainSeq">
@@ -25020,7 +23966,7 @@
   <p:timing>
     <p:tnLst>
       <p:par>
-        <p:cTn xmlns:p14="http://schemas.microsoft.com/office/powerpoint/2010/main" id="1" dur="indefinite" restart="never" nodeType="tmRoot"/>
+        <p:cTn id="1" dur="indefinite" restart="never" nodeType="tmRoot"/>
       </p:par>
     </p:tnLst>
   </p:timing>
@@ -25182,7 +24128,7 @@
   <p:timing>
     <p:tnLst>
       <p:par>
-        <p:cTn xmlns:p14="http://schemas.microsoft.com/office/powerpoint/2010/main" id="1" dur="indefinite" restart="never" nodeType="tmRoot"/>
+        <p:cTn id="1" dur="indefinite" restart="never" nodeType="tmRoot"/>
       </p:par>
     </p:tnLst>
   </p:timing>
@@ -25604,7 +24550,7 @@
   <p:timing>
     <p:tnLst>
       <p:par>
-        <p:cTn xmlns:p14="http://schemas.microsoft.com/office/powerpoint/2010/main" id="1" dur="indefinite" restart="never" nodeType="tmRoot"/>
+        <p:cTn id="1" dur="indefinite" restart="never" nodeType="tmRoot"/>
       </p:par>
     </p:tnLst>
   </p:timing>
@@ -26086,7 +25032,23 @@
                   <a:schemeClr val="tx2"/>
                 </a:solidFill>
               </a:rPr>
-              <a:t>geht keine Risikos ein</a:t>
+              <a:t>geht keine </a:t>
+            </a:r>
+            <a:r>
+              <a:rPr lang="de-DE" b="1" dirty="0" smtClean="0">
+                <a:solidFill>
+                  <a:schemeClr val="tx2"/>
+                </a:solidFill>
+              </a:rPr>
+              <a:t>Risiken </a:t>
+            </a:r>
+            <a:r>
+              <a:rPr lang="de-DE" b="1" dirty="0" smtClean="0">
+                <a:solidFill>
+                  <a:schemeClr val="tx2"/>
+                </a:solidFill>
+              </a:rPr>
+              <a:t>ein</a:t>
             </a:r>
             <a:endParaRPr lang="en-US" b="1" dirty="0">
               <a:solidFill>
@@ -26237,7 +25199,7 @@
   <p:timing>
     <p:tnLst>
       <p:par>
-        <p:cTn xmlns:p14="http://schemas.microsoft.com/office/powerpoint/2010/main" id="1" dur="indefinite" restart="never" nodeType="tmRoot"/>
+        <p:cTn id="1" dur="indefinite" restart="never" nodeType="tmRoot"/>
       </p:par>
     </p:tnLst>
   </p:timing>
@@ -26719,7 +25681,23 @@
                   <a:schemeClr val="tx2"/>
                 </a:solidFill>
               </a:rPr>
-              <a:t>geht keine Risikos ein</a:t>
+              <a:t>geht keine </a:t>
+            </a:r>
+            <a:r>
+              <a:rPr lang="de-DE" b="1" dirty="0" smtClean="0">
+                <a:solidFill>
+                  <a:schemeClr val="tx2"/>
+                </a:solidFill>
+              </a:rPr>
+              <a:t>Risiken </a:t>
+            </a:r>
+            <a:r>
+              <a:rPr lang="de-DE" b="1" dirty="0" smtClean="0">
+                <a:solidFill>
+                  <a:schemeClr val="tx2"/>
+                </a:solidFill>
+              </a:rPr>
+              <a:t>ein</a:t>
             </a:r>
             <a:endParaRPr lang="en-US" b="1" dirty="0">
               <a:solidFill>
@@ -26787,31 +25765,11 @@
               </a:rPr>
               <a:t>Dumping-Strategie</a:t>
             </a:r>
-          </a:p>
-          <a:p>
-            <a:pPr marL="144000" indent="-144000">
-              <a:buFont typeface="Arial" pitchFamily="34" charset="0"/>
-              <a:buChar char="•"/>
-            </a:pPr>
-            <a:endParaRPr lang="de-DE" b="1" dirty="0">
+            <a:endParaRPr lang="de-DE" b="1" dirty="0" smtClean="0">
               <a:solidFill>
                 <a:schemeClr val="tx2"/>
               </a:solidFill>
             </a:endParaRPr>
-          </a:p>
-          <a:p>
-            <a:pPr marL="144000" indent="-144000">
-              <a:buFont typeface="Arial" pitchFamily="34" charset="0"/>
-              <a:buChar char="•"/>
-            </a:pPr>
-            <a:r>
-              <a:rPr lang="de-DE" b="1" dirty="0" smtClean="0">
-                <a:solidFill>
-                  <a:schemeClr val="tx2"/>
-                </a:solidFill>
-              </a:rPr>
-              <a:t>Überschwemmung des Marktes</a:t>
-            </a:r>
           </a:p>
           <a:p>
             <a:pPr marL="144000" indent="-144000">
@@ -26903,6 +25861,64 @@
           </a:p>
         </p:txBody>
       </p:sp>
+      <p:sp>
+        <p:nvSpPr>
+          <p:cNvPr id="18" name="Rechteck 17"/>
+          <p:cNvSpPr/>
+          <p:nvPr/>
+        </p:nvSpPr>
+        <p:spPr>
+          <a:xfrm>
+            <a:off x="661263" y="2251575"/>
+            <a:ext cx="2178947" cy="1080000"/>
+          </a:xfrm>
+          <a:prstGeom prst="rect">
+            <a:avLst/>
+          </a:prstGeom>
+          <a:solidFill>
+            <a:schemeClr val="bg1">
+              <a:alpha val="70000"/>
+            </a:schemeClr>
+          </a:solidFill>
+          <a:ln>
+            <a:noFill/>
+          </a:ln>
+          <a:scene3d>
+            <a:camera prst="obliqueTopRight"/>
+            <a:lightRig rig="threePt" dir="tl"/>
+          </a:scene3d>
+          <a:sp3d/>
+        </p:spPr>
+        <p:style>
+          <a:lnRef idx="1">
+            <a:schemeClr val="accent1"/>
+          </a:lnRef>
+          <a:fillRef idx="3">
+            <a:schemeClr val="accent1"/>
+          </a:fillRef>
+          <a:effectRef idx="2">
+            <a:schemeClr val="accent1"/>
+          </a:effectRef>
+          <a:fontRef idx="minor">
+            <a:schemeClr val="lt1"/>
+          </a:fontRef>
+        </p:style>
+        <p:txBody>
+          <a:bodyPr rtlCol="0" anchor="t" anchorCtr="0"/>
+          <a:lstStyle/>
+          <a:p>
+            <a:pPr marL="144000" indent="-144000">
+              <a:buFont typeface="Arial" pitchFamily="34" charset="0"/>
+              <a:buChar char="•"/>
+            </a:pPr>
+            <a:endParaRPr lang="en-US" b="1" dirty="0">
+              <a:solidFill>
+                <a:schemeClr val="tx2"/>
+              </a:solidFill>
+            </a:endParaRPr>
+          </a:p>
+        </p:txBody>
+      </p:sp>
     </p:spTree>
     <p:extLst>
       <p:ext uri="{BB962C8B-B14F-4D97-AF65-F5344CB8AC3E}">
@@ -26928,7 +25944,7 @@
   <p:timing>
     <p:tnLst>
       <p:par>
-        <p:cTn xmlns:p14="http://schemas.microsoft.com/office/powerpoint/2010/main" id="1" dur="indefinite" restart="never" nodeType="tmRoot"/>
+        <p:cTn id="1" dur="indefinite" restart="never" nodeType="tmRoot"/>
       </p:par>
     </p:tnLst>
   </p:timing>
@@ -27410,7 +26426,23 @@
                   <a:schemeClr val="tx2"/>
                 </a:solidFill>
               </a:rPr>
-              <a:t>geht keine Risikos ein</a:t>
+              <a:t>geht keine </a:t>
+            </a:r>
+            <a:r>
+              <a:rPr lang="de-DE" b="1" dirty="0" smtClean="0">
+                <a:solidFill>
+                  <a:schemeClr val="tx2"/>
+                </a:solidFill>
+              </a:rPr>
+              <a:t>Risiken </a:t>
+            </a:r>
+            <a:r>
+              <a:rPr lang="de-DE" b="1" dirty="0" smtClean="0">
+                <a:solidFill>
+                  <a:schemeClr val="tx2"/>
+                </a:solidFill>
+              </a:rPr>
+              <a:t>ein</a:t>
             </a:r>
             <a:endParaRPr lang="en-US" b="1" dirty="0">
               <a:solidFill>
@@ -27480,35 +26512,6 @@
             </a:r>
           </a:p>
           <a:p>
-            <a:pPr marL="144000" indent="-144000">
-              <a:buFont typeface="Arial" pitchFamily="34" charset="0"/>
-              <a:buChar char="•"/>
-            </a:pPr>
-            <a:endParaRPr lang="de-DE" b="1" dirty="0">
-              <a:solidFill>
-                <a:schemeClr val="tx2"/>
-              </a:solidFill>
-            </a:endParaRPr>
-          </a:p>
-          <a:p>
-            <a:pPr marL="144000" indent="-144000">
-              <a:buFont typeface="Arial" pitchFamily="34" charset="0"/>
-              <a:buChar char="•"/>
-            </a:pPr>
-            <a:r>
-              <a:rPr lang="de-DE" b="1" dirty="0" smtClean="0">
-                <a:solidFill>
-                  <a:schemeClr val="tx2"/>
-                </a:solidFill>
-              </a:rPr>
-              <a:t>Überschwemmung des Marktes</a:t>
-            </a:r>
-          </a:p>
-          <a:p>
-            <a:pPr marL="144000" indent="-144000">
-              <a:buFont typeface="Arial" pitchFamily="34" charset="0"/>
-              <a:buChar char="•"/>
-            </a:pPr>
             <a:endParaRPr lang="de-DE" b="1" dirty="0">
               <a:solidFill>
                 <a:schemeClr val="tx2"/>
@@ -27627,6 +26630,122 @@
           </a:p>
         </p:txBody>
       </p:sp>
+      <p:sp>
+        <p:nvSpPr>
+          <p:cNvPr id="18" name="Rechteck 17"/>
+          <p:cNvSpPr/>
+          <p:nvPr/>
+        </p:nvSpPr>
+        <p:spPr>
+          <a:xfrm>
+            <a:off x="3482526" y="2219325"/>
+            <a:ext cx="2178947" cy="1112250"/>
+          </a:xfrm>
+          <a:prstGeom prst="rect">
+            <a:avLst/>
+          </a:prstGeom>
+          <a:solidFill>
+            <a:schemeClr val="bg1">
+              <a:alpha val="70000"/>
+            </a:schemeClr>
+          </a:solidFill>
+          <a:ln>
+            <a:noFill/>
+          </a:ln>
+          <a:scene3d>
+            <a:camera prst="obliqueTopRight"/>
+            <a:lightRig rig="threePt" dir="tl"/>
+          </a:scene3d>
+          <a:sp3d/>
+        </p:spPr>
+        <p:style>
+          <a:lnRef idx="1">
+            <a:schemeClr val="accent1"/>
+          </a:lnRef>
+          <a:fillRef idx="3">
+            <a:schemeClr val="accent1"/>
+          </a:fillRef>
+          <a:effectRef idx="2">
+            <a:schemeClr val="accent1"/>
+          </a:effectRef>
+          <a:fontRef idx="minor">
+            <a:schemeClr val="lt1"/>
+          </a:fontRef>
+        </p:style>
+        <p:txBody>
+          <a:bodyPr rtlCol="0" anchor="t" anchorCtr="0"/>
+          <a:lstStyle/>
+          <a:p>
+            <a:pPr marL="144000" indent="-144000">
+              <a:buFont typeface="Arial" pitchFamily="34" charset="0"/>
+              <a:buChar char="•"/>
+            </a:pPr>
+            <a:endParaRPr lang="en-US" b="1" dirty="0">
+              <a:solidFill>
+                <a:schemeClr val="tx2"/>
+              </a:solidFill>
+            </a:endParaRPr>
+          </a:p>
+        </p:txBody>
+      </p:sp>
+      <p:sp>
+        <p:nvSpPr>
+          <p:cNvPr id="19" name="Rechteck 18"/>
+          <p:cNvSpPr/>
+          <p:nvPr/>
+        </p:nvSpPr>
+        <p:spPr>
+          <a:xfrm>
+            <a:off x="661263" y="2219325"/>
+            <a:ext cx="2178947" cy="1112250"/>
+          </a:xfrm>
+          <a:prstGeom prst="rect">
+            <a:avLst/>
+          </a:prstGeom>
+          <a:solidFill>
+            <a:schemeClr val="bg1">
+              <a:alpha val="70000"/>
+            </a:schemeClr>
+          </a:solidFill>
+          <a:ln>
+            <a:noFill/>
+          </a:ln>
+          <a:scene3d>
+            <a:camera prst="obliqueTopRight"/>
+            <a:lightRig rig="threePt" dir="tl"/>
+          </a:scene3d>
+          <a:sp3d/>
+        </p:spPr>
+        <p:style>
+          <a:lnRef idx="1">
+            <a:schemeClr val="accent1"/>
+          </a:lnRef>
+          <a:fillRef idx="3">
+            <a:schemeClr val="accent1"/>
+          </a:fillRef>
+          <a:effectRef idx="2">
+            <a:schemeClr val="accent1"/>
+          </a:effectRef>
+          <a:fontRef idx="minor">
+            <a:schemeClr val="lt1"/>
+          </a:fontRef>
+        </p:style>
+        <p:txBody>
+          <a:bodyPr rtlCol="0" anchor="t" anchorCtr="0"/>
+          <a:lstStyle/>
+          <a:p>
+            <a:pPr marL="144000" indent="-144000">
+              <a:buFont typeface="Arial" pitchFamily="34" charset="0"/>
+              <a:buChar char="•"/>
+            </a:pPr>
+            <a:endParaRPr lang="en-US" b="1" dirty="0">
+              <a:solidFill>
+                <a:schemeClr val="tx2"/>
+              </a:solidFill>
+            </a:endParaRPr>
+          </a:p>
+        </p:txBody>
+      </p:sp>
     </p:spTree>
     <p:extLst>
       <p:ext uri="{BB962C8B-B14F-4D97-AF65-F5344CB8AC3E}">
@@ -27652,7 +26771,7 @@
   <p:timing>
     <p:tnLst>
       <p:par>
-        <p:cTn xmlns:p14="http://schemas.microsoft.com/office/powerpoint/2010/main" id="1" dur="indefinite" restart="never" nodeType="tmRoot"/>
+        <p:cTn id="1" dur="indefinite" restart="never" nodeType="tmRoot"/>
       </p:par>
     </p:tnLst>
   </p:timing>
@@ -27789,7 +26908,7 @@
   <p:timing>
     <p:tnLst>
       <p:par>
-        <p:cTn xmlns:p14="http://schemas.microsoft.com/office/powerpoint/2010/main" id="1" dur="indefinite" restart="never" nodeType="tmRoot"/>
+        <p:cTn id="1" dur="indefinite" restart="never" nodeType="tmRoot"/>
       </p:par>
     </p:tnLst>
   </p:timing>
@@ -27926,7 +27045,7 @@
   <p:timing>
     <p:tnLst>
       <p:par>
-        <p:cTn xmlns:p14="http://schemas.microsoft.com/office/powerpoint/2010/main" id="1" dur="indefinite" restart="never" nodeType="tmRoot"/>
+        <p:cTn id="1" dur="indefinite" restart="never" nodeType="tmRoot"/>
       </p:par>
     </p:tnLst>
   </p:timing>
@@ -28400,11 +27519,11 @@
   <p:clrMapOvr>
     <a:masterClrMapping/>
   </p:clrMapOvr>
-  <p:transition xmlns:p14="http://schemas.microsoft.com/office/powerpoint/2010/main"/>
+  <p:transition/>
   <p:timing>
     <p:tnLst>
       <p:par>
-        <p:cTn xmlns:p14="http://schemas.microsoft.com/office/powerpoint/2010/main" id="1" dur="indefinite" restart="never" nodeType="tmRoot">
+        <p:cTn id="1" dur="indefinite" restart="never" nodeType="tmRoot">
           <p:childTnLst>
             <p:seq concurrent="1" nextAc="seek">
               <p:cTn id="2" dur="indefinite" nodeType="mainSeq">
@@ -28775,7 +27894,7 @@
   <p:timing>
     <p:tnLst>
       <p:par>
-        <p:cTn xmlns:p14="http://schemas.microsoft.com/office/powerpoint/2010/main" id="1" dur="indefinite" restart="never" nodeType="tmRoot"/>
+        <p:cTn id="1" dur="indefinite" restart="never" nodeType="tmRoot"/>
       </p:par>
     </p:tnLst>
   </p:timing>
@@ -29502,7 +28621,7 @@
   <p:timing>
     <p:tnLst>
       <p:par>
-        <p:cTn xmlns:p14="http://schemas.microsoft.com/office/powerpoint/2010/main" id="1" dur="indefinite" restart="never" nodeType="tmRoot">
+        <p:cTn id="1" dur="indefinite" restart="never" nodeType="tmRoot">
           <p:childTnLst>
             <p:seq concurrent="1" nextAc="seek">
               <p:cTn id="2" dur="indefinite" nodeType="mainSeq">
@@ -29987,7 +29106,7 @@
   <p:timing>
     <p:tnLst>
       <p:par>
-        <p:cTn xmlns:p14="http://schemas.microsoft.com/office/powerpoint/2010/main" id="1" dur="indefinite" restart="never" nodeType="tmRoot"/>
+        <p:cTn id="1" dur="indefinite" restart="never" nodeType="tmRoot"/>
       </p:par>
     </p:tnLst>
   </p:timing>
@@ -30124,7 +29243,7 @@
   <p:timing>
     <p:tnLst>
       <p:par>
-        <p:cTn xmlns:p14="http://schemas.microsoft.com/office/powerpoint/2010/main" id="1" dur="indefinite" restart="never" nodeType="tmRoot"/>
+        <p:cTn id="1" dur="indefinite" restart="never" nodeType="tmRoot"/>
       </p:par>
     </p:tnLst>
   </p:timing>
@@ -30502,7 +29621,7 @@
   <p:timing>
     <p:tnLst>
       <p:par>
-        <p:cTn xmlns:p14="http://schemas.microsoft.com/office/powerpoint/2010/main" id="1" dur="indefinite" restart="never" nodeType="tmRoot"/>
+        <p:cTn id="1" dur="indefinite" restart="never" nodeType="tmRoot"/>
       </p:par>
     </p:tnLst>
   </p:timing>

</xml_diff>